<commit_message>
robot actor message driven
</commit_message>
<xml_diff>
--- a/it.unibo.issLabStart/userDocs/ISSM2020.pptx
+++ b/it.unibo.issLabStart/userDocs/ISSM2020.pptx
@@ -5,10 +5,10 @@
     <p:sldMasterId id="2147483804" r:id="rId1"/>
   </p:sldMasterIdLst>
   <p:notesMasterIdLst>
-    <p:notesMasterId r:id="rId30"/>
+    <p:notesMasterId r:id="rId31"/>
   </p:notesMasterIdLst>
   <p:handoutMasterIdLst>
-    <p:handoutMasterId r:id="rId31"/>
+    <p:handoutMasterId r:id="rId32"/>
   </p:handoutMasterIdLst>
   <p:sldIdLst>
     <p:sldId id="256" r:id="rId2"/>
@@ -37,8 +37,9 @@
     <p:sldId id="280" r:id="rId25"/>
     <p:sldId id="282" r:id="rId26"/>
     <p:sldId id="284" r:id="rId27"/>
-    <p:sldId id="283" r:id="rId28"/>
-    <p:sldId id="281" r:id="rId29"/>
+    <p:sldId id="285" r:id="rId28"/>
+    <p:sldId id="283" r:id="rId29"/>
+    <p:sldId id="281" r:id="rId30"/>
   </p:sldIdLst>
   <p:sldSz cx="9144000" cy="6858000" type="screen4x3"/>
   <p:notesSz cx="6858000" cy="9144000"/>
@@ -139,7 +140,7 @@
   </p:defaultTextStyle>
   <p:extLst>
     <p:ext uri="{EFAFB233-063F-42B5-8137-9DF3F51BA10A}">
-      <p15:sldGuideLst xmlns:p15="http://schemas.microsoft.com/office/powerpoint/2012/main" xmlns="">
+      <p15:sldGuideLst xmlns:p15="http://schemas.microsoft.com/office/powerpoint/2012/main">
         <p15:guide id="1" orient="horz" pos="2160">
           <p15:clr>
             <a:srgbClr val="A4A3A4"/>
@@ -304,7 +305,7 @@
           <a:p>
             <a:fld id="{661B1FA1-FFFF-470E-82D0-53E008B5CA59}" type="slidenum">
               <a:rPr lang="en-GB" smtClean="0"/>
-              <a:t>‹N›</a:t>
+              <a:t>‹#›</a:t>
             </a:fld>
             <a:endParaRPr lang="en-GB"/>
           </a:p>
@@ -563,7 +564,7 @@
           <a:p>
             <a:fld id="{5D547B64-7F69-451B-8351-3B4EE3E72C48}" type="slidenum">
               <a:rPr lang="en-GB" smtClean="0"/>
-              <a:t>‹N›</a:t>
+              <a:t>‹#›</a:t>
             </a:fld>
             <a:endParaRPr lang="en-GB"/>
           </a:p>
@@ -1026,7 +1027,7 @@
           <a:p>
             <a:fld id="{6F6A5AB3-AF76-4EC9-853D-D4C335162C13}" type="slidenum">
               <a:rPr lang="en-GB" smtClean="0"/>
-              <a:t>‹N›</a:t>
+              <a:t>‹#›</a:t>
             </a:fld>
             <a:endParaRPr lang="en-GB"/>
           </a:p>
@@ -1373,7 +1374,7 @@
           <a:p>
             <a:fld id="{6F6A5AB3-AF76-4EC9-853D-D4C335162C13}" type="slidenum">
               <a:rPr lang="en-GB" smtClean="0"/>
-              <a:t>‹N›</a:t>
+              <a:t>‹#›</a:t>
             </a:fld>
             <a:endParaRPr lang="en-GB"/>
           </a:p>
@@ -1552,7 +1553,7 @@
           <a:p>
             <a:fld id="{6F6A5AB3-AF76-4EC9-853D-D4C335162C13}" type="slidenum">
               <a:rPr lang="en-GB" smtClean="0"/>
-              <a:t>‹N›</a:t>
+              <a:t>‹#›</a:t>
             </a:fld>
             <a:endParaRPr lang="en-GB"/>
           </a:p>
@@ -1669,7 +1670,7 @@
           <a:p>
             <a:fld id="{6F6A5AB3-AF76-4EC9-853D-D4C335162C13}" type="slidenum">
               <a:rPr lang="en-GB" smtClean="0"/>
-              <a:t>‹N›</a:t>
+              <a:t>‹#›</a:t>
             </a:fld>
             <a:endParaRPr lang="en-GB"/>
           </a:p>
@@ -2183,7 +2184,7 @@
           <a:p>
             <a:fld id="{6F6A5AB3-AF76-4EC9-853D-D4C335162C13}" type="slidenum">
               <a:rPr lang="en-GB" smtClean="0"/>
-              <a:t>‹N›</a:t>
+              <a:t>‹#›</a:t>
             </a:fld>
             <a:endParaRPr lang="en-GB"/>
           </a:p>
@@ -2300,7 +2301,7 @@
           <a:p>
             <a:fld id="{6F6A5AB3-AF76-4EC9-853D-D4C335162C13}" type="slidenum">
               <a:rPr lang="en-GB" smtClean="0"/>
-              <a:t>‹N›</a:t>
+              <a:t>‹#›</a:t>
             </a:fld>
             <a:endParaRPr lang="en-GB"/>
           </a:p>
@@ -2666,7 +2667,7 @@
           <a:p>
             <a:fld id="{6F6A5AB3-AF76-4EC9-853D-D4C335162C13}" type="slidenum">
               <a:rPr lang="en-GB" smtClean="0"/>
-              <a:t>‹N›</a:t>
+              <a:t>‹#›</a:t>
             </a:fld>
             <a:endParaRPr lang="en-GB"/>
           </a:p>
@@ -2897,7 +2898,7 @@
           <a:p>
             <a:fld id="{6F6A5AB3-AF76-4EC9-853D-D4C335162C13}" type="slidenum">
               <a:rPr lang="en-GB" smtClean="0"/>
-              <a:t>‹N›</a:t>
+              <a:t>‹#›</a:t>
             </a:fld>
             <a:endParaRPr lang="en-GB"/>
           </a:p>
@@ -2991,7 +2992,7 @@
           <a:p>
             <a:fld id="{6F6A5AB3-AF76-4EC9-853D-D4C335162C13}" type="slidenum">
               <a:rPr lang="en-GB" smtClean="0"/>
-              <a:t>‹N›</a:t>
+              <a:t>‹#›</a:t>
             </a:fld>
             <a:endParaRPr lang="en-GB"/>
           </a:p>
@@ -3262,7 +3263,7 @@
           <a:p>
             <a:fld id="{6F6A5AB3-AF76-4EC9-853D-D4C335162C13}" type="slidenum">
               <a:rPr lang="en-GB" smtClean="0"/>
-              <a:t>‹N›</a:t>
+              <a:t>‹#›</a:t>
             </a:fld>
             <a:endParaRPr lang="en-GB"/>
           </a:p>
@@ -3504,7 +3505,7 @@
           <a:p>
             <a:fld id="{6F6A5AB3-AF76-4EC9-853D-D4C335162C13}" type="slidenum">
               <a:rPr lang="en-GB" smtClean="0"/>
-              <a:t>‹N›</a:t>
+              <a:t>‹#›</a:t>
             </a:fld>
             <a:endParaRPr lang="en-GB"/>
           </a:p>
@@ -4037,7 +4038,7 @@
           <a:p>
             <a:fld id="{6F6A5AB3-AF76-4EC9-853D-D4C335162C13}" type="slidenum">
               <a:rPr lang="en-GB" smtClean="0"/>
-              <a:t>‹N›</a:t>
+              <a:t>‹#›</a:t>
             </a:fld>
             <a:endParaRPr lang="en-GB"/>
           </a:p>
@@ -11775,7 +11776,7 @@
           <p:cNvPr id="22" name="Gruppo 82">
             <a:extLst>
               <a:ext uri="{FF2B5EF4-FFF2-40B4-BE49-F238E27FC236}">
-                <a16:creationId xmlns:a16="http://schemas.microsoft.com/office/drawing/2014/main" xmlns="" id="{D2ACE5A8-9046-43C9-855F-EC0E0754E6E4}"/>
+                <a16:creationId xmlns:a16="http://schemas.microsoft.com/office/drawing/2014/main" id="{D2ACE5A8-9046-43C9-855F-EC0E0754E6E4}"/>
               </a:ext>
             </a:extLst>
           </p:cNvPr>
@@ -11795,7 +11796,7 @@
             <p:cNvPr id="23" name="Ovale 38">
               <a:extLst>
                 <a:ext uri="{FF2B5EF4-FFF2-40B4-BE49-F238E27FC236}">
-                  <a16:creationId xmlns:a16="http://schemas.microsoft.com/office/drawing/2014/main" xmlns="" id="{A3C33013-DAC5-4DE5-9575-78DF66227DDF}"/>
+                  <a16:creationId xmlns:a16="http://schemas.microsoft.com/office/drawing/2014/main" id="{A3C33013-DAC5-4DE5-9575-78DF66227DDF}"/>
                 </a:ext>
               </a:extLst>
             </p:cNvPr>
@@ -11846,7 +11847,7 @@
             <p:cNvPr id="24" name="Rettangolo 39">
               <a:extLst>
                 <a:ext uri="{FF2B5EF4-FFF2-40B4-BE49-F238E27FC236}">
-                  <a16:creationId xmlns:a16="http://schemas.microsoft.com/office/drawing/2014/main" xmlns="" id="{94A5922D-9265-4A79-9770-BC1C16A107CA}"/>
+                  <a16:creationId xmlns:a16="http://schemas.microsoft.com/office/drawing/2014/main" id="{94A5922D-9265-4A79-9770-BC1C16A107CA}"/>
                 </a:ext>
               </a:extLst>
             </p:cNvPr>
@@ -11894,7 +11895,7 @@
             <p:cNvPr id="25" name="Triangolo isoscele 42">
               <a:extLst>
                 <a:ext uri="{FF2B5EF4-FFF2-40B4-BE49-F238E27FC236}">
-                  <a16:creationId xmlns:a16="http://schemas.microsoft.com/office/drawing/2014/main" xmlns="" id="{A0FD7BD4-A807-4F3B-A3BC-009F1B02A9D4}"/>
+                  <a16:creationId xmlns:a16="http://schemas.microsoft.com/office/drawing/2014/main" id="{A0FD7BD4-A807-4F3B-A3BC-009F1B02A9D4}"/>
                 </a:ext>
               </a:extLst>
             </p:cNvPr>
@@ -11947,7 +11948,7 @@
           <p:cNvPr id="26" name="Ovale 33">
             <a:extLst>
               <a:ext uri="{FF2B5EF4-FFF2-40B4-BE49-F238E27FC236}">
-                <a16:creationId xmlns:a16="http://schemas.microsoft.com/office/drawing/2014/main" xmlns="" id="{EE7E7EAA-6204-4C59-9F31-DF632E43B747}"/>
+                <a16:creationId xmlns:a16="http://schemas.microsoft.com/office/drawing/2014/main" id="{EE7E7EAA-6204-4C59-9F31-DF632E43B747}"/>
               </a:ext>
             </a:extLst>
           </p:cNvPr>
@@ -11995,7 +11996,7 @@
           <p:cNvPr id="28" name="CasellaDiTesto 19">
             <a:extLst>
               <a:ext uri="{FF2B5EF4-FFF2-40B4-BE49-F238E27FC236}">
-                <a16:creationId xmlns:a16="http://schemas.microsoft.com/office/drawing/2014/main" xmlns="" id="{7B23BAA7-7D89-43BE-B88E-D25D840BA294}"/>
+                <a16:creationId xmlns:a16="http://schemas.microsoft.com/office/drawing/2014/main" id="{7B23BAA7-7D89-43BE-B88E-D25D840BA294}"/>
               </a:ext>
             </a:extLst>
           </p:cNvPr>
@@ -12031,7 +12032,7 @@
           <p:cNvPr id="10" name="Rectangle 4">
             <a:extLst>
               <a:ext uri="{FF2B5EF4-FFF2-40B4-BE49-F238E27FC236}">
-                <a16:creationId xmlns:a16="http://schemas.microsoft.com/office/drawing/2014/main" xmlns="" id="{9285CE8F-211F-4A96-BEFB-E42C50887C6A}"/>
+                <a16:creationId xmlns:a16="http://schemas.microsoft.com/office/drawing/2014/main" id="{9285CE8F-211F-4A96-BEFB-E42C50887C6A}"/>
               </a:ext>
             </a:extLst>
           </p:cNvPr>
@@ -12090,7 +12091,7 @@
           <p:cNvPr id="29" name="Connettore 2 126">
             <a:extLst>
               <a:ext uri="{FF2B5EF4-FFF2-40B4-BE49-F238E27FC236}">
-                <a16:creationId xmlns:a16="http://schemas.microsoft.com/office/drawing/2014/main" xmlns="" id="{0AA0E6A2-F525-4C64-9B41-8AAC54C8346D}"/>
+                <a16:creationId xmlns:a16="http://schemas.microsoft.com/office/drawing/2014/main" id="{0AA0E6A2-F525-4C64-9B41-8AAC54C8346D}"/>
               </a:ext>
             </a:extLst>
           </p:cNvPr>
@@ -12133,7 +12134,7 @@
           <p:cNvPr id="30" name="Connettore 2 9">
             <a:extLst>
               <a:ext uri="{FF2B5EF4-FFF2-40B4-BE49-F238E27FC236}">
-                <a16:creationId xmlns:a16="http://schemas.microsoft.com/office/drawing/2014/main" xmlns="" id="{01EF4D93-4E7B-4DFB-AE38-808AA1CF2663}"/>
+                <a16:creationId xmlns:a16="http://schemas.microsoft.com/office/drawing/2014/main" id="{01EF4D93-4E7B-4DFB-AE38-808AA1CF2663}"/>
               </a:ext>
             </a:extLst>
           </p:cNvPr>
@@ -12174,7 +12175,7 @@
           <p:cNvPr id="33" name="Rectangle 5">
             <a:extLst>
               <a:ext uri="{FF2B5EF4-FFF2-40B4-BE49-F238E27FC236}">
-                <a16:creationId xmlns:a16="http://schemas.microsoft.com/office/drawing/2014/main" xmlns="" id="{663699FD-7F2E-4DD1-B4BF-227A041C24B8}"/>
+                <a16:creationId xmlns:a16="http://schemas.microsoft.com/office/drawing/2014/main" id="{663699FD-7F2E-4DD1-B4BF-227A041C24B8}"/>
               </a:ext>
             </a:extLst>
           </p:cNvPr>
@@ -12247,7 +12248,7 @@
           <p:cNvPr id="36" name="Rectangle 4">
             <a:extLst>
               <a:ext uri="{FF2B5EF4-FFF2-40B4-BE49-F238E27FC236}">
-                <a16:creationId xmlns:a16="http://schemas.microsoft.com/office/drawing/2014/main" xmlns="" id="{751C612F-85E8-46CD-9D97-711C49FABD7D}"/>
+                <a16:creationId xmlns:a16="http://schemas.microsoft.com/office/drawing/2014/main" id="{751C612F-85E8-46CD-9D97-711C49FABD7D}"/>
               </a:ext>
             </a:extLst>
           </p:cNvPr>
@@ -12294,7 +12295,7 @@
           <p:cNvPr id="38" name="Ovale 33">
             <a:extLst>
               <a:ext uri="{FF2B5EF4-FFF2-40B4-BE49-F238E27FC236}">
-                <a16:creationId xmlns:a16="http://schemas.microsoft.com/office/drawing/2014/main" xmlns="" id="{AE821BAD-5AB7-466B-8291-7E14ADF08024}"/>
+                <a16:creationId xmlns:a16="http://schemas.microsoft.com/office/drawing/2014/main" id="{AE821BAD-5AB7-466B-8291-7E14ADF08024}"/>
               </a:ext>
             </a:extLst>
           </p:cNvPr>
@@ -12342,7 +12343,7 @@
           <p:cNvPr id="39" name="CasellaDiTesto 19">
             <a:extLst>
               <a:ext uri="{FF2B5EF4-FFF2-40B4-BE49-F238E27FC236}">
-                <a16:creationId xmlns:a16="http://schemas.microsoft.com/office/drawing/2014/main" xmlns="" id="{EF542A0F-AE9B-4720-A22D-4000E774217C}"/>
+                <a16:creationId xmlns:a16="http://schemas.microsoft.com/office/drawing/2014/main" id="{EF542A0F-AE9B-4720-A22D-4000E774217C}"/>
               </a:ext>
             </a:extLst>
           </p:cNvPr>
@@ -12378,7 +12379,7 @@
           <p:cNvPr id="40" name="Rectangle 4">
             <a:extLst>
               <a:ext uri="{FF2B5EF4-FFF2-40B4-BE49-F238E27FC236}">
-                <a16:creationId xmlns:a16="http://schemas.microsoft.com/office/drawing/2014/main" xmlns="" id="{DC75D623-1BEE-420F-8F7A-642F64C29300}"/>
+                <a16:creationId xmlns:a16="http://schemas.microsoft.com/office/drawing/2014/main" id="{DC75D623-1BEE-420F-8F7A-642F64C29300}"/>
               </a:ext>
             </a:extLst>
           </p:cNvPr>
@@ -12463,7 +12464,7 @@
           <p:cNvPr id="41" name="Connettore 2 126">
             <a:extLst>
               <a:ext uri="{FF2B5EF4-FFF2-40B4-BE49-F238E27FC236}">
-                <a16:creationId xmlns:a16="http://schemas.microsoft.com/office/drawing/2014/main" xmlns="" id="{B9484729-5BBF-42A0-9532-D074E8F64D0C}"/>
+                <a16:creationId xmlns:a16="http://schemas.microsoft.com/office/drawing/2014/main" id="{B9484729-5BBF-42A0-9532-D074E8F64D0C}"/>
               </a:ext>
             </a:extLst>
           </p:cNvPr>
@@ -12506,7 +12507,7 @@
           <p:cNvPr id="42" name="Connettore 2 9">
             <a:extLst>
               <a:ext uri="{FF2B5EF4-FFF2-40B4-BE49-F238E27FC236}">
-                <a16:creationId xmlns:a16="http://schemas.microsoft.com/office/drawing/2014/main" xmlns="" id="{2227C48D-AA34-4D81-9873-E2E1601CDD36}"/>
+                <a16:creationId xmlns:a16="http://schemas.microsoft.com/office/drawing/2014/main" id="{2227C48D-AA34-4D81-9873-E2E1601CDD36}"/>
               </a:ext>
             </a:extLst>
           </p:cNvPr>
@@ -12526,6 +12527,9 @@
             <a:avLst/>
           </a:prstGeom>
           <a:ln>
+            <a:solidFill>
+              <a:srgbClr val="002060"/>
+            </a:solidFill>
             <a:tailEnd type="arrow"/>
           </a:ln>
         </p:spPr>
@@ -12549,7 +12553,7 @@
           <p:cNvPr id="43" name="Rectangle 5">
             <a:extLst>
               <a:ext uri="{FF2B5EF4-FFF2-40B4-BE49-F238E27FC236}">
-                <a16:creationId xmlns:a16="http://schemas.microsoft.com/office/drawing/2014/main" xmlns="" id="{FDD84F83-30AC-4BF9-B9FF-5314654605F2}"/>
+                <a16:creationId xmlns:a16="http://schemas.microsoft.com/office/drawing/2014/main" id="{FDD84F83-30AC-4BF9-B9FF-5314654605F2}"/>
               </a:ext>
             </a:extLst>
           </p:cNvPr>
@@ -12610,7 +12614,7 @@
           <p:cNvPr id="45" name="Rectangle 5">
             <a:extLst>
               <a:ext uri="{FF2B5EF4-FFF2-40B4-BE49-F238E27FC236}">
-                <a16:creationId xmlns:a16="http://schemas.microsoft.com/office/drawing/2014/main" xmlns="" id="{E24D6CA4-2BC9-4AE1-95CB-AED96FDB9560}"/>
+                <a16:creationId xmlns:a16="http://schemas.microsoft.com/office/drawing/2014/main" id="{E24D6CA4-2BC9-4AE1-95CB-AED96FDB9560}"/>
               </a:ext>
             </a:extLst>
           </p:cNvPr>
@@ -12650,7 +12654,7 @@
           <p:cNvPr id="46" name="Ovale 33">
             <a:extLst>
               <a:ext uri="{FF2B5EF4-FFF2-40B4-BE49-F238E27FC236}">
-                <a16:creationId xmlns:a16="http://schemas.microsoft.com/office/drawing/2014/main" xmlns="" id="{9DB22A3B-B6A7-4E63-A408-51B043370910}"/>
+                <a16:creationId xmlns:a16="http://schemas.microsoft.com/office/drawing/2014/main" id="{9DB22A3B-B6A7-4E63-A408-51B043370910}"/>
               </a:ext>
             </a:extLst>
           </p:cNvPr>
@@ -12698,7 +12702,7 @@
           <p:cNvPr id="48" name="Straight Arrow Connector 47">
             <a:extLst>
               <a:ext uri="{FF2B5EF4-FFF2-40B4-BE49-F238E27FC236}">
-                <a16:creationId xmlns:a16="http://schemas.microsoft.com/office/drawing/2014/main" xmlns="" id="{68E3D2D9-1905-4E34-9DAF-86766AC88CC1}"/>
+                <a16:creationId xmlns:a16="http://schemas.microsoft.com/office/drawing/2014/main" id="{68E3D2D9-1905-4E34-9DAF-86766AC88CC1}"/>
               </a:ext>
             </a:extLst>
           </p:cNvPr>
@@ -12740,7 +12744,7 @@
           <p:cNvPr id="52" name="Rectangle 5">
             <a:extLst>
               <a:ext uri="{FF2B5EF4-FFF2-40B4-BE49-F238E27FC236}">
-                <a16:creationId xmlns:a16="http://schemas.microsoft.com/office/drawing/2014/main" xmlns="" id="{9529310F-209D-4FC3-82E8-EEC7E3A85851}"/>
+                <a16:creationId xmlns:a16="http://schemas.microsoft.com/office/drawing/2014/main" id="{9529310F-209D-4FC3-82E8-EEC7E3A85851}"/>
               </a:ext>
             </a:extLst>
           </p:cNvPr>
@@ -12780,7 +12784,7 @@
           <p:cNvPr id="53" name="Ovale 33">
             <a:extLst>
               <a:ext uri="{FF2B5EF4-FFF2-40B4-BE49-F238E27FC236}">
-                <a16:creationId xmlns:a16="http://schemas.microsoft.com/office/drawing/2014/main" xmlns="" id="{435D5F9E-A655-4DD7-851D-B11A8F169495}"/>
+                <a16:creationId xmlns:a16="http://schemas.microsoft.com/office/drawing/2014/main" id="{435D5F9E-A655-4DD7-851D-B11A8F169495}"/>
               </a:ext>
             </a:extLst>
           </p:cNvPr>
@@ -12828,7 +12832,7 @@
           <p:cNvPr id="54" name="Straight Arrow Connector 53">
             <a:extLst>
               <a:ext uri="{FF2B5EF4-FFF2-40B4-BE49-F238E27FC236}">
-                <a16:creationId xmlns:a16="http://schemas.microsoft.com/office/drawing/2014/main" xmlns="" id="{5F862CA7-7927-4E0C-A697-C0E183A98073}"/>
+                <a16:creationId xmlns:a16="http://schemas.microsoft.com/office/drawing/2014/main" id="{5F862CA7-7927-4E0C-A697-C0E183A98073}"/>
               </a:ext>
             </a:extLst>
           </p:cNvPr>
@@ -12869,7 +12873,7 @@
           <p:cNvPr id="57" name="Connector: Elbow 56">
             <a:extLst>
               <a:ext uri="{FF2B5EF4-FFF2-40B4-BE49-F238E27FC236}">
-                <a16:creationId xmlns:a16="http://schemas.microsoft.com/office/drawing/2014/main" xmlns="" id="{CDFFCB79-ECE8-451E-A967-EFE490B3417F}"/>
+                <a16:creationId xmlns:a16="http://schemas.microsoft.com/office/drawing/2014/main" id="{CDFFCB79-ECE8-451E-A967-EFE490B3417F}"/>
               </a:ext>
             </a:extLst>
           </p:cNvPr>
@@ -12915,7 +12919,7 @@
           <p:cNvPr id="60" name="Oval 59">
             <a:extLst>
               <a:ext uri="{FF2B5EF4-FFF2-40B4-BE49-F238E27FC236}">
-                <a16:creationId xmlns:a16="http://schemas.microsoft.com/office/drawing/2014/main" xmlns="" id="{14ACD13F-7496-4B90-AE98-8683062A6B76}"/>
+                <a16:creationId xmlns:a16="http://schemas.microsoft.com/office/drawing/2014/main" id="{14ACD13F-7496-4B90-AE98-8683062A6B76}"/>
               </a:ext>
             </a:extLst>
           </p:cNvPr>
@@ -12969,7 +12973,7 @@
           <p:cNvPr id="35" name="Connettore 2 92">
             <a:extLst>
               <a:ext uri="{FF2B5EF4-FFF2-40B4-BE49-F238E27FC236}">
-                <a16:creationId xmlns:a16="http://schemas.microsoft.com/office/drawing/2014/main" xmlns="" id="{D129B3F1-E984-4808-8DB5-56CC7FF47729}"/>
+                <a16:creationId xmlns:a16="http://schemas.microsoft.com/office/drawing/2014/main" id="{D129B3F1-E984-4808-8DB5-56CC7FF47729}"/>
               </a:ext>
             </a:extLst>
           </p:cNvPr>
@@ -13009,7 +13013,7 @@
           <p:cNvPr id="75" name="Rectangle 5">
             <a:extLst>
               <a:ext uri="{FF2B5EF4-FFF2-40B4-BE49-F238E27FC236}">
-                <a16:creationId xmlns:a16="http://schemas.microsoft.com/office/drawing/2014/main" xmlns="" id="{D7416450-7D3D-45F7-A403-375C44C4136F}"/>
+                <a16:creationId xmlns:a16="http://schemas.microsoft.com/office/drawing/2014/main" id="{D7416450-7D3D-45F7-A403-375C44C4136F}"/>
               </a:ext>
             </a:extLst>
           </p:cNvPr>
@@ -13020,8 +13024,8 @@
         </p:nvSpPr>
         <p:spPr bwMode="auto">
           <a:xfrm>
-            <a:off x="1485750" y="5441310"/>
-            <a:ext cx="2582193" cy="523220"/>
+            <a:off x="1485751" y="5441310"/>
+            <a:ext cx="1540684" cy="523220"/>
           </a:xfrm>
           <a:prstGeom prst="rect">
             <a:avLst/>
@@ -13049,10 +13053,20 @@
                 <a:latin typeface="Arial" panose="020B0604020202020204" pitchFamily="34" charset="0"/>
                 <a:cs typeface="Arial" panose="020B0604020202020204" pitchFamily="34" charset="0"/>
               </a:rPr>
-              <a:t>( NAME, DISTANCE)</a:t>
-            </a:r>
-          </a:p>
-          <a:p>
+              <a:t> ….</a:t>
+            </a:r>
+          </a:p>
+          <a:p>
+            <a:r>
+              <a:rPr lang="en-US" altLang="en-US" sz="1400" b="1" dirty="0" err="1">
+                <a:solidFill>
+                  <a:srgbClr val="00B050"/>
+                </a:solidFill>
+                <a:latin typeface="Arial" panose="020B0604020202020204" pitchFamily="34" charset="0"/>
+                <a:cs typeface="Arial" panose="020B0604020202020204" pitchFamily="34" charset="0"/>
+              </a:rPr>
+              <a:t>sollision</a:t>
+            </a:r>
             <a:r>
               <a:rPr lang="en-US" altLang="en-US" sz="1400" b="1" dirty="0">
                 <a:solidFill>
@@ -13061,15 +13075,90 @@
                 <a:latin typeface="Arial" panose="020B0604020202020204" pitchFamily="34" charset="0"/>
                 <a:cs typeface="Arial" panose="020B0604020202020204" pitchFamily="34" charset="0"/>
               </a:rPr>
-              <a:t>collision</a:t>
+              <a:t> …</a:t>
+            </a:r>
+            <a:endParaRPr lang="en-US" altLang="en-US" sz="1400" dirty="0">
+              <a:latin typeface="Arial" panose="020B0604020202020204" pitchFamily="34" charset="0"/>
+              <a:cs typeface="Arial" panose="020B0604020202020204" pitchFamily="34" charset="0"/>
+            </a:endParaRPr>
+          </a:p>
+        </p:txBody>
+      </p:sp>
+      <p:sp>
+        <p:nvSpPr>
+          <p:cNvPr id="47" name="Rectangle 5">
+            <a:extLst>
+              <a:ext uri="{FF2B5EF4-FFF2-40B4-BE49-F238E27FC236}">
+                <a16:creationId xmlns:a16="http://schemas.microsoft.com/office/drawing/2014/main" id="{1269A7C2-A3FB-4FFD-AABE-7CAC46ADBE47}"/>
+              </a:ext>
+            </a:extLst>
+          </p:cNvPr>
+          <p:cNvSpPr>
+            <a:spLocks noChangeArrowheads="1"/>
+          </p:cNvSpPr>
+          <p:nvPr/>
+        </p:nvSpPr>
+        <p:spPr bwMode="auto">
+          <a:xfrm>
+            <a:off x="599427" y="3720278"/>
+            <a:ext cx="1024792" cy="738664"/>
+          </a:xfrm>
+          <a:prstGeom prst="rect">
+            <a:avLst/>
+          </a:prstGeom>
+          <a:noFill/>
+        </p:spPr>
+        <p:txBody>
+          <a:bodyPr wrap="square" rtlCol="0">
+            <a:spAutoFit/>
+          </a:bodyPr>
+          <a:lstStyle/>
+          <a:p>
+            <a:r>
+              <a:rPr lang="en-US" altLang="en-US" sz="1400" b="1" dirty="0" err="1">
+                <a:solidFill>
+                  <a:srgbClr val="00B050"/>
+                </a:solidFill>
+                <a:latin typeface="Arial" panose="020B0604020202020204" pitchFamily="34" charset="0"/>
+                <a:cs typeface="Arial" panose="020B0604020202020204" pitchFamily="34" charset="0"/>
+              </a:rPr>
+              <a:t>init</a:t>
             </a:r>
             <a:r>
               <a:rPr lang="en-US" altLang="en-US" sz="1400" dirty="0">
                 <a:latin typeface="Arial" panose="020B0604020202020204" pitchFamily="34" charset="0"/>
                 <a:cs typeface="Arial" panose="020B0604020202020204" pitchFamily="34" charset="0"/>
               </a:rPr>
-              <a:t>( NAME ) </a:t>
-            </a:r>
+              <a:t> ….</a:t>
+            </a:r>
+          </a:p>
+          <a:p>
+            <a:r>
+              <a:rPr lang="en-US" altLang="en-US" sz="1400" b="1" dirty="0">
+                <a:solidFill>
+                  <a:srgbClr val="00B050"/>
+                </a:solidFill>
+                <a:latin typeface="Arial" panose="020B0604020202020204" pitchFamily="34" charset="0"/>
+                <a:cs typeface="Arial" panose="020B0604020202020204" pitchFamily="34" charset="0"/>
+              </a:rPr>
+              <a:t>end …</a:t>
+            </a:r>
+          </a:p>
+          <a:p>
+            <a:r>
+              <a:rPr lang="en-US" altLang="en-US" sz="1400" b="1" dirty="0">
+                <a:solidFill>
+                  <a:srgbClr val="00B050"/>
+                </a:solidFill>
+                <a:latin typeface="Arial" panose="020B0604020202020204" pitchFamily="34" charset="0"/>
+                <a:cs typeface="Arial" panose="020B0604020202020204" pitchFamily="34" charset="0"/>
+              </a:rPr>
+              <a:t>move …</a:t>
+            </a:r>
+            <a:endParaRPr lang="en-US" altLang="en-US" sz="1400" dirty="0">
+              <a:latin typeface="Arial" panose="020B0604020202020204" pitchFamily="34" charset="0"/>
+              <a:cs typeface="Arial" panose="020B0604020202020204" pitchFamily="34" charset="0"/>
+            </a:endParaRPr>
           </a:p>
         </p:txBody>
       </p:sp>
@@ -13154,7 +13243,7 @@
           <p:cNvPr id="22" name="Gruppo 82">
             <a:extLst>
               <a:ext uri="{FF2B5EF4-FFF2-40B4-BE49-F238E27FC236}">
-                <a16:creationId xmlns:a16="http://schemas.microsoft.com/office/drawing/2014/main" xmlns="" id="{D2ACE5A8-9046-43C9-855F-EC0E0754E6E4}"/>
+                <a16:creationId xmlns:a16="http://schemas.microsoft.com/office/drawing/2014/main" id="{D2ACE5A8-9046-43C9-855F-EC0E0754E6E4}"/>
               </a:ext>
             </a:extLst>
           </p:cNvPr>
@@ -13174,7 +13263,7 @@
             <p:cNvPr id="23" name="Ovale 38">
               <a:extLst>
                 <a:ext uri="{FF2B5EF4-FFF2-40B4-BE49-F238E27FC236}">
-                  <a16:creationId xmlns:a16="http://schemas.microsoft.com/office/drawing/2014/main" xmlns="" id="{A3C33013-DAC5-4DE5-9575-78DF66227DDF}"/>
+                  <a16:creationId xmlns:a16="http://schemas.microsoft.com/office/drawing/2014/main" id="{A3C33013-DAC5-4DE5-9575-78DF66227DDF}"/>
                 </a:ext>
               </a:extLst>
             </p:cNvPr>
@@ -13225,7 +13314,7 @@
             <p:cNvPr id="24" name="Rettangolo 39">
               <a:extLst>
                 <a:ext uri="{FF2B5EF4-FFF2-40B4-BE49-F238E27FC236}">
-                  <a16:creationId xmlns:a16="http://schemas.microsoft.com/office/drawing/2014/main" xmlns="" id="{94A5922D-9265-4A79-9770-BC1C16A107CA}"/>
+                  <a16:creationId xmlns:a16="http://schemas.microsoft.com/office/drawing/2014/main" id="{94A5922D-9265-4A79-9770-BC1C16A107CA}"/>
                 </a:ext>
               </a:extLst>
             </p:cNvPr>
@@ -13273,7 +13362,7 @@
             <p:cNvPr id="25" name="Triangolo isoscele 42">
               <a:extLst>
                 <a:ext uri="{FF2B5EF4-FFF2-40B4-BE49-F238E27FC236}">
-                  <a16:creationId xmlns:a16="http://schemas.microsoft.com/office/drawing/2014/main" xmlns="" id="{A0FD7BD4-A807-4F3B-A3BC-009F1B02A9D4}"/>
+                  <a16:creationId xmlns:a16="http://schemas.microsoft.com/office/drawing/2014/main" id="{A0FD7BD4-A807-4F3B-A3BC-009F1B02A9D4}"/>
                 </a:ext>
               </a:extLst>
             </p:cNvPr>
@@ -13326,7 +13415,7 @@
           <p:cNvPr id="36" name="Rectangle 4">
             <a:extLst>
               <a:ext uri="{FF2B5EF4-FFF2-40B4-BE49-F238E27FC236}">
-                <a16:creationId xmlns:a16="http://schemas.microsoft.com/office/drawing/2014/main" xmlns="" id="{751C612F-85E8-46CD-9D97-711C49FABD7D}"/>
+                <a16:creationId xmlns:a16="http://schemas.microsoft.com/office/drawing/2014/main" id="{751C612F-85E8-46CD-9D97-711C49FABD7D}"/>
               </a:ext>
             </a:extLst>
           </p:cNvPr>
@@ -13338,7 +13427,7 @@
         <p:spPr bwMode="auto">
           <a:xfrm>
             <a:off x="1166751" y="1168425"/>
-            <a:ext cx="1109599" cy="307777"/>
+            <a:ext cx="1378647" cy="307777"/>
           </a:xfrm>
           <a:prstGeom prst="rect">
             <a:avLst/>
@@ -13359,7 +13448,7 @@
                 <a:latin typeface="Arial" panose="020B0604020202020204" pitchFamily="34" charset="0"/>
                 <a:cs typeface="Arial" panose="020B0604020202020204" pitchFamily="34" charset="0"/>
               </a:rPr>
-              <a:t>robotActor</a:t>
+              <a:t>robotActorTry</a:t>
             </a:r>
             <a:endParaRPr lang="en-US" altLang="en-US" sz="1400" dirty="0">
               <a:latin typeface="Arial" panose="020B0604020202020204" pitchFamily="34" charset="0"/>
@@ -13373,7 +13462,7 @@
           <p:cNvPr id="38" name="Ovale 33">
             <a:extLst>
               <a:ext uri="{FF2B5EF4-FFF2-40B4-BE49-F238E27FC236}">
-                <a16:creationId xmlns:a16="http://schemas.microsoft.com/office/drawing/2014/main" xmlns="" id="{AE821BAD-5AB7-466B-8291-7E14ADF08024}"/>
+                <a16:creationId xmlns:a16="http://schemas.microsoft.com/office/drawing/2014/main" id="{AE821BAD-5AB7-466B-8291-7E14ADF08024}"/>
               </a:ext>
             </a:extLst>
           </p:cNvPr>
@@ -13421,7 +13510,7 @@
           <p:cNvPr id="39" name="CasellaDiTesto 19">
             <a:extLst>
               <a:ext uri="{FF2B5EF4-FFF2-40B4-BE49-F238E27FC236}">
-                <a16:creationId xmlns:a16="http://schemas.microsoft.com/office/drawing/2014/main" xmlns="" id="{EF542A0F-AE9B-4720-A22D-4000E774217C}"/>
+                <a16:creationId xmlns:a16="http://schemas.microsoft.com/office/drawing/2014/main" id="{EF542A0F-AE9B-4720-A22D-4000E774217C}"/>
               </a:ext>
             </a:extLst>
           </p:cNvPr>
@@ -13457,7 +13546,7 @@
           <p:cNvPr id="40" name="Rectangle 4">
             <a:extLst>
               <a:ext uri="{FF2B5EF4-FFF2-40B4-BE49-F238E27FC236}">
-                <a16:creationId xmlns:a16="http://schemas.microsoft.com/office/drawing/2014/main" xmlns="" id="{DC75D623-1BEE-420F-8F7A-642F64C29300}"/>
+                <a16:creationId xmlns:a16="http://schemas.microsoft.com/office/drawing/2014/main" id="{DC75D623-1BEE-420F-8F7A-642F64C29300}"/>
               </a:ext>
             </a:extLst>
           </p:cNvPr>
@@ -13469,7 +13558,7 @@
         <p:spPr bwMode="auto">
           <a:xfrm>
             <a:off x="3633537" y="1052736"/>
-            <a:ext cx="2810385" cy="738664"/>
+            <a:ext cx="3079433" cy="738664"/>
           </a:xfrm>
           <a:prstGeom prst="rect">
             <a:avLst/>
@@ -13482,6 +13571,41 @@
           </a:bodyPr>
           <a:lstStyle/>
           <a:p>
+            <a:r>
+              <a:rPr lang="en-US" sz="1400" b="1" dirty="0" err="1">
+                <a:solidFill>
+                  <a:srgbClr val="0070C0"/>
+                </a:solidFill>
+                <a:latin typeface="Arial" panose="020B0604020202020204" pitchFamily="34" charset="0"/>
+                <a:cs typeface="Arial" panose="020B0604020202020204" pitchFamily="34" charset="0"/>
+              </a:rPr>
+              <a:t>virtualRobotSupport</a:t>
+            </a:r>
+            <a:endParaRPr lang="en-US" altLang="en-US" sz="1400" b="1" dirty="0">
+              <a:solidFill>
+                <a:srgbClr val="0070C0"/>
+              </a:solidFill>
+              <a:latin typeface="Arial" panose="020B0604020202020204" pitchFamily="34" charset="0"/>
+              <a:cs typeface="Arial" panose="020B0604020202020204" pitchFamily="34" charset="0"/>
+            </a:endParaRPr>
+          </a:p>
+          <a:p>
+            <a:r>
+              <a:rPr lang="en-US" altLang="en-US" sz="1400" dirty="0">
+                <a:latin typeface="Arial" panose="020B0604020202020204" pitchFamily="34" charset="0"/>
+                <a:cs typeface="Arial" panose="020B0604020202020204" pitchFamily="34" charset="0"/>
+              </a:rPr>
+              <a:t>(starts a coroutine that </a:t>
+            </a:r>
+          </a:p>
+          <a:p>
+            <a:r>
+              <a:rPr lang="en-US" altLang="en-US" sz="1400" dirty="0">
+                <a:latin typeface="Arial" panose="020B0604020202020204" pitchFamily="34" charset="0"/>
+                <a:cs typeface="Arial" panose="020B0604020202020204" pitchFamily="34" charset="0"/>
+              </a:rPr>
+              <a:t>sends messages to </a:t>
+            </a:r>
             <a:r>
               <a:rPr lang="en-US" altLang="en-US" sz="1400" b="1" dirty="0" err="1">
                 <a:solidFill>
@@ -13490,42 +13614,7 @@
                 <a:latin typeface="Arial" panose="020B0604020202020204" pitchFamily="34" charset="0"/>
                 <a:cs typeface="Arial" panose="020B0604020202020204" pitchFamily="34" charset="0"/>
               </a:rPr>
-              <a:t>robotSupport</a:t>
-            </a:r>
-            <a:endParaRPr lang="en-US" altLang="en-US" sz="1400" b="1" dirty="0">
-              <a:solidFill>
-                <a:srgbClr val="0070C0"/>
-              </a:solidFill>
-              <a:latin typeface="Arial" panose="020B0604020202020204" pitchFamily="34" charset="0"/>
-              <a:cs typeface="Arial" panose="020B0604020202020204" pitchFamily="34" charset="0"/>
-            </a:endParaRPr>
-          </a:p>
-          <a:p>
-            <a:r>
-              <a:rPr lang="en-US" altLang="en-US" sz="1400" dirty="0">
-                <a:latin typeface="Arial" panose="020B0604020202020204" pitchFamily="34" charset="0"/>
-                <a:cs typeface="Arial" panose="020B0604020202020204" pitchFamily="34" charset="0"/>
-              </a:rPr>
-              <a:t>(starts a coroutine that </a:t>
-            </a:r>
-          </a:p>
-          <a:p>
-            <a:r>
-              <a:rPr lang="en-US" altLang="en-US" sz="1400" dirty="0">
-                <a:latin typeface="Arial" panose="020B0604020202020204" pitchFamily="34" charset="0"/>
-                <a:cs typeface="Arial" panose="020B0604020202020204" pitchFamily="34" charset="0"/>
-              </a:rPr>
-              <a:t>sends messages to </a:t>
-            </a:r>
-            <a:r>
-              <a:rPr lang="en-US" altLang="en-US" sz="1400" b="1" dirty="0" err="1">
-                <a:solidFill>
-                  <a:srgbClr val="0070C0"/>
-                </a:solidFill>
-                <a:latin typeface="Arial" panose="020B0604020202020204" pitchFamily="34" charset="0"/>
-                <a:cs typeface="Arial" panose="020B0604020202020204" pitchFamily="34" charset="0"/>
-              </a:rPr>
-              <a:t>robotActor</a:t>
+              <a:t>robotActorTry</a:t>
             </a:r>
             <a:r>
               <a:rPr lang="en-US" altLang="en-US" sz="1400" dirty="0">
@@ -13542,7 +13631,7 @@
           <p:cNvPr id="41" name="Connettore 2 126">
             <a:extLst>
               <a:ext uri="{FF2B5EF4-FFF2-40B4-BE49-F238E27FC236}">
-                <a16:creationId xmlns:a16="http://schemas.microsoft.com/office/drawing/2014/main" xmlns="" id="{B9484729-5BBF-42A0-9532-D074E8F64D0C}"/>
+                <a16:creationId xmlns:a16="http://schemas.microsoft.com/office/drawing/2014/main" id="{B9484729-5BBF-42A0-9532-D074E8F64D0C}"/>
               </a:ext>
             </a:extLst>
           </p:cNvPr>
@@ -13585,7 +13674,7 @@
           <p:cNvPr id="42" name="Connettore 2 9">
             <a:extLst>
               <a:ext uri="{FF2B5EF4-FFF2-40B4-BE49-F238E27FC236}">
-                <a16:creationId xmlns:a16="http://schemas.microsoft.com/office/drawing/2014/main" xmlns="" id="{2227C48D-AA34-4D81-9873-E2E1601CDD36}"/>
+                <a16:creationId xmlns:a16="http://schemas.microsoft.com/office/drawing/2014/main" id="{2227C48D-AA34-4D81-9873-E2E1601CDD36}"/>
               </a:ext>
             </a:extLst>
           </p:cNvPr>
@@ -13628,7 +13717,7 @@
           <p:cNvPr id="43" name="Rectangle 5">
             <a:extLst>
               <a:ext uri="{FF2B5EF4-FFF2-40B4-BE49-F238E27FC236}">
-                <a16:creationId xmlns:a16="http://schemas.microsoft.com/office/drawing/2014/main" xmlns="" id="{FDD84F83-30AC-4BF9-B9FF-5314654605F2}"/>
+                <a16:creationId xmlns:a16="http://schemas.microsoft.com/office/drawing/2014/main" id="{FDD84F83-30AC-4BF9-B9FF-5314654605F2}"/>
               </a:ext>
             </a:extLst>
           </p:cNvPr>
@@ -13689,7 +13778,7 @@
           <p:cNvPr id="52" name="Rectangle 5">
             <a:extLst>
               <a:ext uri="{FF2B5EF4-FFF2-40B4-BE49-F238E27FC236}">
-                <a16:creationId xmlns:a16="http://schemas.microsoft.com/office/drawing/2014/main" xmlns="" id="{9529310F-209D-4FC3-82E8-EEC7E3A85851}"/>
+                <a16:creationId xmlns:a16="http://schemas.microsoft.com/office/drawing/2014/main" id="{9529310F-209D-4FC3-82E8-EEC7E3A85851}"/>
               </a:ext>
             </a:extLst>
           </p:cNvPr>
@@ -13729,7 +13818,7 @@
           <p:cNvPr id="53" name="Ovale 33">
             <a:extLst>
               <a:ext uri="{FF2B5EF4-FFF2-40B4-BE49-F238E27FC236}">
-                <a16:creationId xmlns:a16="http://schemas.microsoft.com/office/drawing/2014/main" xmlns="" id="{435D5F9E-A655-4DD7-851D-B11A8F169495}"/>
+                <a16:creationId xmlns:a16="http://schemas.microsoft.com/office/drawing/2014/main" id="{435D5F9E-A655-4DD7-851D-B11A8F169495}"/>
               </a:ext>
             </a:extLst>
           </p:cNvPr>
@@ -13777,7 +13866,7 @@
           <p:cNvPr id="54" name="Straight Arrow Connector 53">
             <a:extLst>
               <a:ext uri="{FF2B5EF4-FFF2-40B4-BE49-F238E27FC236}">
-                <a16:creationId xmlns:a16="http://schemas.microsoft.com/office/drawing/2014/main" xmlns="" id="{5F862CA7-7927-4E0C-A697-C0E183A98073}"/>
+                <a16:creationId xmlns:a16="http://schemas.microsoft.com/office/drawing/2014/main" id="{5F862CA7-7927-4E0C-A697-C0E183A98073}"/>
               </a:ext>
             </a:extLst>
           </p:cNvPr>
@@ -13818,7 +13907,7 @@
           <p:cNvPr id="57" name="Connector: Elbow 56">
             <a:extLst>
               <a:ext uri="{FF2B5EF4-FFF2-40B4-BE49-F238E27FC236}">
-                <a16:creationId xmlns:a16="http://schemas.microsoft.com/office/drawing/2014/main" xmlns="" id="{CDFFCB79-ECE8-451E-A967-EFE490B3417F}"/>
+                <a16:creationId xmlns:a16="http://schemas.microsoft.com/office/drawing/2014/main" id="{CDFFCB79-ECE8-451E-A967-EFE490B3417F}"/>
               </a:ext>
             </a:extLst>
           </p:cNvPr>
@@ -13864,7 +13953,7 @@
           <p:cNvPr id="60" name="Oval 59">
             <a:extLst>
               <a:ext uri="{FF2B5EF4-FFF2-40B4-BE49-F238E27FC236}">
-                <a16:creationId xmlns:a16="http://schemas.microsoft.com/office/drawing/2014/main" xmlns="" id="{14ACD13F-7496-4B90-AE98-8683062A6B76}"/>
+                <a16:creationId xmlns:a16="http://schemas.microsoft.com/office/drawing/2014/main" id="{14ACD13F-7496-4B90-AE98-8683062A6B76}"/>
               </a:ext>
             </a:extLst>
           </p:cNvPr>
@@ -13918,7 +14007,7 @@
           <p:cNvPr id="35" name="Connettore 2 92">
             <a:extLst>
               <a:ext uri="{FF2B5EF4-FFF2-40B4-BE49-F238E27FC236}">
-                <a16:creationId xmlns:a16="http://schemas.microsoft.com/office/drawing/2014/main" xmlns="" id="{D129B3F1-E984-4808-8DB5-56CC7FF47729}"/>
+                <a16:creationId xmlns:a16="http://schemas.microsoft.com/office/drawing/2014/main" id="{D129B3F1-E984-4808-8DB5-56CC7FF47729}"/>
               </a:ext>
             </a:extLst>
           </p:cNvPr>
@@ -13955,75 +14044,6 @@
       </p:cxnSp>
       <p:sp>
         <p:nvSpPr>
-          <p:cNvPr id="75" name="Rectangle 5">
-            <a:extLst>
-              <a:ext uri="{FF2B5EF4-FFF2-40B4-BE49-F238E27FC236}">
-                <a16:creationId xmlns:a16="http://schemas.microsoft.com/office/drawing/2014/main" xmlns="" id="{D7416450-7D3D-45F7-A403-375C44C4136F}"/>
-              </a:ext>
-            </a:extLst>
-          </p:cNvPr>
-          <p:cNvSpPr>
-            <a:spLocks noChangeArrowheads="1"/>
-          </p:cNvSpPr>
-          <p:nvPr/>
-        </p:nvSpPr>
-        <p:spPr bwMode="auto">
-          <a:xfrm>
-            <a:off x="1254461" y="1685568"/>
-            <a:ext cx="2582193" cy="523220"/>
-          </a:xfrm>
-          <a:prstGeom prst="rect">
-            <a:avLst/>
-          </a:prstGeom>
-          <a:noFill/>
-        </p:spPr>
-        <p:txBody>
-          <a:bodyPr wrap="square" rtlCol="0">
-            <a:spAutoFit/>
-          </a:bodyPr>
-          <a:lstStyle/>
-          <a:p>
-            <a:r>
-              <a:rPr lang="en-US" altLang="en-US" sz="1400" b="1" dirty="0">
-                <a:solidFill>
-                  <a:srgbClr val="00B050"/>
-                </a:solidFill>
-                <a:latin typeface="Arial" panose="020B0604020202020204" pitchFamily="34" charset="0"/>
-                <a:cs typeface="Arial" panose="020B0604020202020204" pitchFamily="34" charset="0"/>
-              </a:rPr>
-              <a:t>sensor</a:t>
-            </a:r>
-            <a:r>
-              <a:rPr lang="en-US" altLang="en-US" sz="1400" dirty="0">
-                <a:latin typeface="Arial" panose="020B0604020202020204" pitchFamily="34" charset="0"/>
-                <a:cs typeface="Arial" panose="020B0604020202020204" pitchFamily="34" charset="0"/>
-              </a:rPr>
-              <a:t>( NAME, DISTANCE)</a:t>
-            </a:r>
-          </a:p>
-          <a:p>
-            <a:r>
-              <a:rPr lang="en-US" altLang="en-US" sz="1400" b="1" dirty="0">
-                <a:solidFill>
-                  <a:srgbClr val="00B050"/>
-                </a:solidFill>
-                <a:latin typeface="Arial" panose="020B0604020202020204" pitchFamily="34" charset="0"/>
-                <a:cs typeface="Arial" panose="020B0604020202020204" pitchFamily="34" charset="0"/>
-              </a:rPr>
-              <a:t>collision</a:t>
-            </a:r>
-            <a:r>
-              <a:rPr lang="en-US" altLang="en-US" sz="1400" dirty="0">
-                <a:latin typeface="Arial" panose="020B0604020202020204" pitchFamily="34" charset="0"/>
-                <a:cs typeface="Arial" panose="020B0604020202020204" pitchFamily="34" charset="0"/>
-              </a:rPr>
-              <a:t>( NAME ) </a:t>
-            </a:r>
-          </a:p>
-        </p:txBody>
-      </p:sp>
-      <p:sp>
-        <p:nvSpPr>
           <p:cNvPr id="47" name="Ovale 46"/>
           <p:cNvSpPr/>
           <p:nvPr/>
@@ -14062,7 +14082,7 @@
           <a:p>
             <a:pPr algn="ctr"/>
             <a:r>
-              <a:rPr lang="it-IT" dirty="0" err="1" smtClean="0"/>
+              <a:rPr lang="it-IT" dirty="0" err="1"/>
               <a:t>working</a:t>
             </a:r>
             <a:endParaRPr lang="en-GB" dirty="0"/>
@@ -14171,7 +14191,7 @@
           <a:lstStyle/>
           <a:p>
             <a:r>
-              <a:rPr lang="it-IT" b="1" dirty="0" err="1" smtClean="0">
+              <a:rPr lang="it-IT" b="1" dirty="0" err="1">
                 <a:solidFill>
                   <a:srgbClr val="8A0000"/>
                 </a:solidFill>
@@ -14226,7 +14246,7 @@
           <a:p>
             <a:pPr algn="ctr"/>
             <a:r>
-              <a:rPr lang="it-IT" dirty="0" err="1" smtClean="0"/>
+              <a:rPr lang="it-IT" dirty="0" err="1"/>
               <a:t>doInit</a:t>
             </a:r>
             <a:endParaRPr lang="en-GB" dirty="0"/>
@@ -14273,7 +14293,7 @@
           <a:p>
             <a:pPr algn="ctr"/>
             <a:r>
-              <a:rPr lang="it-IT" dirty="0" err="1" smtClean="0"/>
+              <a:rPr lang="it-IT" dirty="0" err="1"/>
               <a:t>doEnd</a:t>
             </a:r>
             <a:endParaRPr lang="en-GB" dirty="0"/>
@@ -14414,7 +14434,7 @@
           <a:p>
             <a:pPr algn="ctr"/>
             <a:r>
-              <a:rPr lang="it-IT" dirty="0" err="1" smtClean="0"/>
+              <a:rPr lang="it-IT" dirty="0" err="1"/>
               <a:t>doMove</a:t>
             </a:r>
             <a:endParaRPr lang="en-GB" dirty="0"/>
@@ -14828,7 +14848,7 @@
           <a:lstStyle/>
           <a:p>
             <a:r>
-              <a:rPr lang="it-IT" b="1" dirty="0" smtClean="0">
+              <a:rPr lang="it-IT" b="1" dirty="0">
                 <a:solidFill>
                   <a:srgbClr val="8A0000"/>
                 </a:solidFill>
@@ -14866,7 +14886,7 @@
           <a:lstStyle/>
           <a:p>
             <a:r>
-              <a:rPr lang="it-IT" b="1" dirty="0" err="1" smtClean="0">
+              <a:rPr lang="it-IT" b="1" dirty="0" err="1">
                 <a:solidFill>
                   <a:srgbClr val="8A0000"/>
                 </a:solidFill>
@@ -14904,7 +14924,7 @@
           <a:lstStyle/>
           <a:p>
             <a:r>
-              <a:rPr lang="it-IT" b="1" dirty="0" err="1" smtClean="0">
+              <a:rPr lang="it-IT" b="1" dirty="0" err="1">
                 <a:solidFill>
                   <a:srgbClr val="8A0000"/>
                 </a:solidFill>
@@ -14942,7 +14962,7 @@
           <a:lstStyle/>
           <a:p>
             <a:r>
-              <a:rPr lang="it-IT" b="1" dirty="0" err="1" smtClean="0">
+              <a:rPr lang="it-IT" b="1" dirty="0" err="1">
                 <a:solidFill>
                   <a:srgbClr val="8A0000"/>
                 </a:solidFill>
@@ -14962,7 +14982,7 @@
           <p:cNvPr id="130" name="Rectangle 5">
             <a:extLst>
               <a:ext uri="{FF2B5EF4-FFF2-40B4-BE49-F238E27FC236}">
-                <a16:creationId xmlns:a16="http://schemas.microsoft.com/office/drawing/2014/main" xmlns="" id="{9529310F-209D-4FC3-82E8-EEC7E3A85851}"/>
+                <a16:creationId xmlns:a16="http://schemas.microsoft.com/office/drawing/2014/main" id="{9529310F-209D-4FC3-82E8-EEC7E3A85851}"/>
               </a:ext>
             </a:extLst>
           </p:cNvPr>
@@ -14988,18 +15008,158 @@
           <a:lstStyle/>
           <a:p>
             <a:r>
-              <a:rPr lang="en-US" altLang="en-US" sz="1400" dirty="0" smtClean="0">
+              <a:rPr lang="en-US" altLang="en-US" sz="1400" dirty="0">
                 <a:latin typeface="Symbol" panose="05050102010706020507" pitchFamily="18" charset="2"/>
                 <a:cs typeface="Arial" panose="020B0604020202020204" pitchFamily="34" charset="0"/>
               </a:rPr>
               <a:t>e</a:t>
             </a:r>
             <a:r>
-              <a:rPr lang="en-US" altLang="en-US" sz="1400" dirty="0" smtClean="0">
+              <a:rPr lang="en-US" altLang="en-US" sz="1400" dirty="0">
                 <a:latin typeface="Arial" panose="020B0604020202020204" pitchFamily="34" charset="0"/>
                 <a:cs typeface="Arial" panose="020B0604020202020204" pitchFamily="34" charset="0"/>
               </a:rPr>
               <a:t>-move</a:t>
+            </a:r>
+          </a:p>
+        </p:txBody>
+      </p:sp>
+      <p:sp>
+        <p:nvSpPr>
+          <p:cNvPr id="46" name="Rectangle 5">
+            <a:extLst>
+              <a:ext uri="{FF2B5EF4-FFF2-40B4-BE49-F238E27FC236}">
+                <a16:creationId xmlns:a16="http://schemas.microsoft.com/office/drawing/2014/main" id="{0CBD2E55-2030-4802-A4F1-C2953AF08AAB}"/>
+              </a:ext>
+            </a:extLst>
+          </p:cNvPr>
+          <p:cNvSpPr>
+            <a:spLocks noChangeArrowheads="1"/>
+          </p:cNvSpPr>
+          <p:nvPr/>
+        </p:nvSpPr>
+        <p:spPr bwMode="auto">
+          <a:xfrm>
+            <a:off x="492108" y="55747"/>
+            <a:ext cx="1024792" cy="738664"/>
+          </a:xfrm>
+          <a:prstGeom prst="rect">
+            <a:avLst/>
+          </a:prstGeom>
+          <a:noFill/>
+        </p:spPr>
+        <p:txBody>
+          <a:bodyPr wrap="square" rtlCol="0">
+            <a:spAutoFit/>
+          </a:bodyPr>
+          <a:lstStyle/>
+          <a:p>
+            <a:r>
+              <a:rPr lang="en-US" altLang="en-US" sz="1400" b="1" dirty="0" err="1">
+                <a:solidFill>
+                  <a:srgbClr val="00B050"/>
+                </a:solidFill>
+                <a:latin typeface="Arial" panose="020B0604020202020204" pitchFamily="34" charset="0"/>
+                <a:cs typeface="Arial" panose="020B0604020202020204" pitchFamily="34" charset="0"/>
+              </a:rPr>
+              <a:t>init</a:t>
+            </a:r>
+            <a:r>
+              <a:rPr lang="en-US" altLang="en-US" sz="1400" dirty="0">
+                <a:latin typeface="Arial" panose="020B0604020202020204" pitchFamily="34" charset="0"/>
+                <a:cs typeface="Arial" panose="020B0604020202020204" pitchFamily="34" charset="0"/>
+              </a:rPr>
+              <a:t> ….</a:t>
+            </a:r>
+          </a:p>
+          <a:p>
+            <a:r>
+              <a:rPr lang="en-US" altLang="en-US" sz="1400" b="1" dirty="0">
+                <a:solidFill>
+                  <a:srgbClr val="00B050"/>
+                </a:solidFill>
+                <a:latin typeface="Arial" panose="020B0604020202020204" pitchFamily="34" charset="0"/>
+                <a:cs typeface="Arial" panose="020B0604020202020204" pitchFamily="34" charset="0"/>
+              </a:rPr>
+              <a:t>end …</a:t>
+            </a:r>
+          </a:p>
+          <a:p>
+            <a:r>
+              <a:rPr lang="en-US" altLang="en-US" sz="1400" b="1" dirty="0">
+                <a:solidFill>
+                  <a:srgbClr val="00B050"/>
+                </a:solidFill>
+                <a:latin typeface="Arial" panose="020B0604020202020204" pitchFamily="34" charset="0"/>
+                <a:cs typeface="Arial" panose="020B0604020202020204" pitchFamily="34" charset="0"/>
+              </a:rPr>
+              <a:t>move …</a:t>
+            </a:r>
+            <a:endParaRPr lang="en-US" altLang="en-US" sz="1400" dirty="0">
+              <a:latin typeface="Arial" panose="020B0604020202020204" pitchFamily="34" charset="0"/>
+              <a:cs typeface="Arial" panose="020B0604020202020204" pitchFamily="34" charset="0"/>
+            </a:endParaRPr>
+          </a:p>
+        </p:txBody>
+      </p:sp>
+      <p:sp>
+        <p:nvSpPr>
+          <p:cNvPr id="48" name="Rectangle 5">
+            <a:extLst>
+              <a:ext uri="{FF2B5EF4-FFF2-40B4-BE49-F238E27FC236}">
+                <a16:creationId xmlns:a16="http://schemas.microsoft.com/office/drawing/2014/main" id="{CF0A08CC-F966-460F-9624-0266DD1496A0}"/>
+              </a:ext>
+            </a:extLst>
+          </p:cNvPr>
+          <p:cNvSpPr>
+            <a:spLocks noChangeArrowheads="1"/>
+          </p:cNvSpPr>
+          <p:nvPr/>
+        </p:nvSpPr>
+        <p:spPr bwMode="auto">
+          <a:xfrm>
+            <a:off x="1289007" y="1664802"/>
+            <a:ext cx="1540684" cy="523220"/>
+          </a:xfrm>
+          <a:prstGeom prst="rect">
+            <a:avLst/>
+          </a:prstGeom>
+          <a:noFill/>
+        </p:spPr>
+        <p:txBody>
+          <a:bodyPr wrap="square" rtlCol="0">
+            <a:spAutoFit/>
+          </a:bodyPr>
+          <a:lstStyle/>
+          <a:p>
+            <a:r>
+              <a:rPr lang="en-US" altLang="en-US" sz="1400" b="1" dirty="0">
+                <a:solidFill>
+                  <a:srgbClr val="00B050"/>
+                </a:solidFill>
+                <a:latin typeface="Arial" panose="020B0604020202020204" pitchFamily="34" charset="0"/>
+                <a:cs typeface="Arial" panose="020B0604020202020204" pitchFamily="34" charset="0"/>
+              </a:rPr>
+              <a:t>sensor</a:t>
+            </a:r>
+            <a:r>
+              <a:rPr lang="en-US" altLang="en-US" sz="1400" dirty="0">
+                <a:latin typeface="Arial" panose="020B0604020202020204" pitchFamily="34" charset="0"/>
+                <a:cs typeface="Arial" panose="020B0604020202020204" pitchFamily="34" charset="0"/>
+              </a:rPr>
+              <a:t> ….</a:t>
+            </a:r>
+          </a:p>
+          <a:p>
+            <a:r>
+              <a:rPr lang="en-US" altLang="en-US" sz="1400" b="1" dirty="0">
+                <a:solidFill>
+                  <a:srgbClr val="00B050"/>
+                </a:solidFill>
+                <a:latin typeface="Arial" panose="020B0604020202020204" pitchFamily="34" charset="0"/>
+                <a:cs typeface="Arial" panose="020B0604020202020204" pitchFamily="34" charset="0"/>
+              </a:rPr>
+              <a:t>collision …</a:t>
             </a:r>
             <a:endParaRPr lang="en-US" altLang="en-US" sz="1400" dirty="0">
               <a:latin typeface="Arial" panose="020B0604020202020204" pitchFamily="34" charset="0"/>
@@ -15040,6 +15200,1849 @@
       </p:grpSpPr>
       <p:sp>
         <p:nvSpPr>
+          <p:cNvPr id="19" name="Rectangle: Rounded Corners 18">
+            <a:extLst>
+              <a:ext uri="{FF2B5EF4-FFF2-40B4-BE49-F238E27FC236}">
+                <a16:creationId xmlns:a16="http://schemas.microsoft.com/office/drawing/2014/main" id="{DE3B0D5F-B032-4ABA-8BA4-86B2ACAE6FE9}"/>
+              </a:ext>
+            </a:extLst>
+          </p:cNvPr>
+          <p:cNvSpPr/>
+          <p:nvPr/>
+        </p:nvSpPr>
+        <p:spPr>
+          <a:xfrm>
+            <a:off x="827584" y="260442"/>
+            <a:ext cx="2520280" cy="1728192"/>
+          </a:xfrm>
+          <a:prstGeom prst="roundRect">
+            <a:avLst/>
+          </a:prstGeom>
+          <a:solidFill>
+            <a:schemeClr val="bg1"/>
+          </a:solidFill>
+          <a:ln>
+            <a:solidFill>
+              <a:srgbClr val="0070C0"/>
+            </a:solidFill>
+          </a:ln>
+        </p:spPr>
+        <p:style>
+          <a:lnRef idx="2">
+            <a:schemeClr val="accent1">
+              <a:shade val="50000"/>
+            </a:schemeClr>
+          </a:lnRef>
+          <a:fillRef idx="1">
+            <a:schemeClr val="accent1"/>
+          </a:fillRef>
+          <a:effectRef idx="0">
+            <a:schemeClr val="accent1"/>
+          </a:effectRef>
+          <a:fontRef idx="minor">
+            <a:schemeClr val="lt1"/>
+          </a:fontRef>
+        </p:style>
+        <p:txBody>
+          <a:bodyPr rtlCol="0" anchor="ctr"/>
+          <a:lstStyle/>
+          <a:p>
+            <a:pPr algn="ctr"/>
+            <a:endParaRPr lang="en-US"/>
+          </a:p>
+        </p:txBody>
+      </p:sp>
+      <p:sp>
+        <p:nvSpPr>
+          <p:cNvPr id="2" name="Footer Placeholder 1">
+            <a:extLst>
+              <a:ext uri="{FF2B5EF4-FFF2-40B4-BE49-F238E27FC236}">
+                <a16:creationId xmlns:a16="http://schemas.microsoft.com/office/drawing/2014/main" id="{AD6894C7-DA5F-4138-A519-491DCC0A630F}"/>
+              </a:ext>
+            </a:extLst>
+          </p:cNvPr>
+          <p:cNvSpPr>
+            <a:spLocks noGrp="1"/>
+          </p:cNvSpPr>
+          <p:nvPr>
+            <p:ph type="ftr" sz="quarter" idx="11"/>
+          </p:nvPr>
+        </p:nvSpPr>
+        <p:spPr/>
+        <p:txBody>
+          <a:bodyPr/>
+          <a:lstStyle/>
+          <a:p>
+            <a:r>
+              <a:rPr lang="it-IT"/>
+              <a:t>ANatali  - DISI - ISSM2020  Univeristy of Bologna</a:t>
+            </a:r>
+            <a:endParaRPr lang="en-GB"/>
+          </a:p>
+        </p:txBody>
+      </p:sp>
+      <p:sp>
+        <p:nvSpPr>
+          <p:cNvPr id="3" name="Slide Number Placeholder 2">
+            <a:extLst>
+              <a:ext uri="{FF2B5EF4-FFF2-40B4-BE49-F238E27FC236}">
+                <a16:creationId xmlns:a16="http://schemas.microsoft.com/office/drawing/2014/main" id="{9F97F589-9197-4852-A296-AC6ABB123CD8}"/>
+              </a:ext>
+            </a:extLst>
+          </p:cNvPr>
+          <p:cNvSpPr>
+            <a:spLocks noGrp="1"/>
+          </p:cNvSpPr>
+          <p:nvPr>
+            <p:ph type="sldNum" sz="quarter" idx="12"/>
+          </p:nvPr>
+        </p:nvSpPr>
+        <p:spPr/>
+        <p:txBody>
+          <a:bodyPr/>
+          <a:lstStyle/>
+          <a:p>
+            <a:fld id="{6F6A5AB3-AF76-4EC9-853D-D4C335162C13}" type="slidenum">
+              <a:rPr lang="en-GB" smtClean="0"/>
+              <a:t>27</a:t>
+            </a:fld>
+            <a:endParaRPr lang="en-GB"/>
+          </a:p>
+        </p:txBody>
+      </p:sp>
+      <p:grpSp>
+        <p:nvGrpSpPr>
+          <p:cNvPr id="4" name="Gruppo 72">
+            <a:extLst>
+              <a:ext uri="{FF2B5EF4-FFF2-40B4-BE49-F238E27FC236}">
+                <a16:creationId xmlns:a16="http://schemas.microsoft.com/office/drawing/2014/main" id="{D4DF3349-65AA-401C-A3D6-D0F89B361E36}"/>
+              </a:ext>
+            </a:extLst>
+          </p:cNvPr>
+          <p:cNvGrpSpPr/>
+          <p:nvPr/>
+        </p:nvGrpSpPr>
+        <p:grpSpPr>
+          <a:xfrm>
+            <a:off x="1163430" y="1510679"/>
+            <a:ext cx="592487" cy="258092"/>
+            <a:chOff x="5133975" y="5295900"/>
+            <a:chExt cx="342900" cy="238125"/>
+          </a:xfrm>
+        </p:grpSpPr>
+        <p:sp>
+          <p:nvSpPr>
+            <p:cNvPr id="5" name="Figura a mano libera 73">
+              <a:extLst>
+                <a:ext uri="{FF2B5EF4-FFF2-40B4-BE49-F238E27FC236}">
+                  <a16:creationId xmlns:a16="http://schemas.microsoft.com/office/drawing/2014/main" id="{5EB43234-5B64-422E-A355-531F36111451}"/>
+                </a:ext>
+              </a:extLst>
+            </p:cNvPr>
+            <p:cNvSpPr/>
+            <p:nvPr/>
+          </p:nvSpPr>
+          <p:spPr>
+            <a:xfrm>
+              <a:off x="5133975" y="5295900"/>
+              <a:ext cx="342900" cy="238125"/>
+            </a:xfrm>
+            <a:custGeom>
+              <a:avLst/>
+              <a:gdLst>
+                <a:gd name="connsiteX0" fmla="*/ 0 w 342900"/>
+                <a:gd name="connsiteY0" fmla="*/ 142875 h 238125"/>
+                <a:gd name="connsiteX1" fmla="*/ 28575 w 342900"/>
+                <a:gd name="connsiteY1" fmla="*/ 38100 h 238125"/>
+                <a:gd name="connsiteX2" fmla="*/ 47625 w 342900"/>
+                <a:gd name="connsiteY2" fmla="*/ 9525 h 238125"/>
+                <a:gd name="connsiteX3" fmla="*/ 76200 w 342900"/>
+                <a:gd name="connsiteY3" fmla="*/ 0 h 238125"/>
+                <a:gd name="connsiteX4" fmla="*/ 104775 w 342900"/>
+                <a:gd name="connsiteY4" fmla="*/ 9525 h 238125"/>
+                <a:gd name="connsiteX5" fmla="*/ 142875 w 342900"/>
+                <a:gd name="connsiteY5" fmla="*/ 95250 h 238125"/>
+                <a:gd name="connsiteX6" fmla="*/ 161925 w 342900"/>
+                <a:gd name="connsiteY6" fmla="*/ 152400 h 238125"/>
+                <a:gd name="connsiteX7" fmla="*/ 171450 w 342900"/>
+                <a:gd name="connsiteY7" fmla="*/ 180975 h 238125"/>
+                <a:gd name="connsiteX8" fmla="*/ 209550 w 342900"/>
+                <a:gd name="connsiteY8" fmla="*/ 238125 h 238125"/>
+                <a:gd name="connsiteX9" fmla="*/ 238125 w 342900"/>
+                <a:gd name="connsiteY9" fmla="*/ 180975 h 238125"/>
+                <a:gd name="connsiteX10" fmla="*/ 266700 w 342900"/>
+                <a:gd name="connsiteY10" fmla="*/ 104775 h 238125"/>
+                <a:gd name="connsiteX11" fmla="*/ 342900 w 342900"/>
+                <a:gd name="connsiteY11" fmla="*/ 85725 h 238125"/>
+              </a:gdLst>
+              <a:ahLst/>
+              <a:cxnLst>
+                <a:cxn ang="0">
+                  <a:pos x="connsiteX0" y="connsiteY0"/>
+                </a:cxn>
+                <a:cxn ang="0">
+                  <a:pos x="connsiteX1" y="connsiteY1"/>
+                </a:cxn>
+                <a:cxn ang="0">
+                  <a:pos x="connsiteX2" y="connsiteY2"/>
+                </a:cxn>
+                <a:cxn ang="0">
+                  <a:pos x="connsiteX3" y="connsiteY3"/>
+                </a:cxn>
+                <a:cxn ang="0">
+                  <a:pos x="connsiteX4" y="connsiteY4"/>
+                </a:cxn>
+                <a:cxn ang="0">
+                  <a:pos x="connsiteX5" y="connsiteY5"/>
+                </a:cxn>
+                <a:cxn ang="0">
+                  <a:pos x="connsiteX6" y="connsiteY6"/>
+                </a:cxn>
+                <a:cxn ang="0">
+                  <a:pos x="connsiteX7" y="connsiteY7"/>
+                </a:cxn>
+                <a:cxn ang="0">
+                  <a:pos x="connsiteX8" y="connsiteY8"/>
+                </a:cxn>
+                <a:cxn ang="0">
+                  <a:pos x="connsiteX9" y="connsiteY9"/>
+                </a:cxn>
+                <a:cxn ang="0">
+                  <a:pos x="connsiteX10" y="connsiteY10"/>
+                </a:cxn>
+                <a:cxn ang="0">
+                  <a:pos x="connsiteX11" y="connsiteY11"/>
+                </a:cxn>
+              </a:cxnLst>
+              <a:rect l="l" t="t" r="r" b="b"/>
+              <a:pathLst>
+                <a:path w="342900" h="238125">
+                  <a:moveTo>
+                    <a:pt x="0" y="142875"/>
+                  </a:moveTo>
+                  <a:cubicBezTo>
+                    <a:pt x="5112" y="117315"/>
+                    <a:pt x="14764" y="58817"/>
+                    <a:pt x="28575" y="38100"/>
+                  </a:cubicBezTo>
+                  <a:cubicBezTo>
+                    <a:pt x="34925" y="28575"/>
+                    <a:pt x="38686" y="16676"/>
+                    <a:pt x="47625" y="9525"/>
+                  </a:cubicBezTo>
+                  <a:cubicBezTo>
+                    <a:pt x="55465" y="3253"/>
+                    <a:pt x="66675" y="3175"/>
+                    <a:pt x="76200" y="0"/>
+                  </a:cubicBezTo>
+                  <a:cubicBezTo>
+                    <a:pt x="85725" y="3175"/>
+                    <a:pt x="96935" y="3253"/>
+                    <a:pt x="104775" y="9525"/>
+                  </a:cubicBezTo>
+                  <a:cubicBezTo>
+                    <a:pt x="125358" y="25992"/>
+                    <a:pt x="137054" y="77787"/>
+                    <a:pt x="142875" y="95250"/>
+                  </a:cubicBezTo>
+                  <a:lnTo>
+                    <a:pt x="161925" y="152400"/>
+                  </a:lnTo>
+                  <a:cubicBezTo>
+                    <a:pt x="165100" y="161925"/>
+                    <a:pt x="169481" y="171130"/>
+                    <a:pt x="171450" y="180975"/>
+                  </a:cubicBezTo>
+                  <a:cubicBezTo>
+                    <a:pt x="182944" y="238445"/>
+                    <a:pt x="165616" y="223480"/>
+                    <a:pt x="209550" y="238125"/>
+                  </a:cubicBezTo>
+                  <a:cubicBezTo>
+                    <a:pt x="228174" y="210189"/>
+                    <a:pt x="230238" y="212523"/>
+                    <a:pt x="238125" y="180975"/>
+                  </a:cubicBezTo>
+                  <a:cubicBezTo>
+                    <a:pt x="243105" y="161054"/>
+                    <a:pt x="243471" y="119293"/>
+                    <a:pt x="266700" y="104775"/>
+                  </a:cubicBezTo>
+                  <a:cubicBezTo>
+                    <a:pt x="300393" y="83717"/>
+                    <a:pt x="313092" y="85725"/>
+                    <a:pt x="342900" y="85725"/>
+                  </a:cubicBezTo>
+                </a:path>
+              </a:pathLst>
+            </a:custGeom>
+            <a:noFill/>
+            <a:ln>
+              <a:solidFill>
+                <a:srgbClr val="C00000"/>
+              </a:solidFill>
+            </a:ln>
+          </p:spPr>
+          <p:style>
+            <a:lnRef idx="2">
+              <a:schemeClr val="accent1">
+                <a:shade val="50000"/>
+              </a:schemeClr>
+            </a:lnRef>
+            <a:fillRef idx="1">
+              <a:schemeClr val="accent1"/>
+            </a:fillRef>
+            <a:effectRef idx="0">
+              <a:schemeClr val="accent1"/>
+            </a:effectRef>
+            <a:fontRef idx="minor">
+              <a:schemeClr val="lt1"/>
+            </a:fontRef>
+          </p:style>
+          <p:txBody>
+            <a:bodyPr rtlCol="0" anchor="ctr"/>
+            <a:lstStyle/>
+            <a:p>
+              <a:pPr algn="ctr"/>
+              <a:endParaRPr lang="it-IT"/>
+            </a:p>
+          </p:txBody>
+        </p:sp>
+        <p:sp>
+          <p:nvSpPr>
+            <p:cNvPr id="6" name="Figura a mano libera 74">
+              <a:extLst>
+                <a:ext uri="{FF2B5EF4-FFF2-40B4-BE49-F238E27FC236}">
+                  <a16:creationId xmlns:a16="http://schemas.microsoft.com/office/drawing/2014/main" id="{FD6DD544-F526-49EB-9FD3-4E25A9A04502}"/>
+                </a:ext>
+              </a:extLst>
+            </p:cNvPr>
+            <p:cNvSpPr/>
+            <p:nvPr/>
+          </p:nvSpPr>
+          <p:spPr>
+            <a:xfrm>
+              <a:off x="5400675" y="5353050"/>
+              <a:ext cx="66675" cy="38100"/>
+            </a:xfrm>
+            <a:custGeom>
+              <a:avLst/>
+              <a:gdLst>
+                <a:gd name="connsiteX0" fmla="*/ 66675 w 66675"/>
+                <a:gd name="connsiteY0" fmla="*/ 38100 h 38100"/>
+                <a:gd name="connsiteX1" fmla="*/ 0 w 66675"/>
+                <a:gd name="connsiteY1" fmla="*/ 0 h 38100"/>
+              </a:gdLst>
+              <a:ahLst/>
+              <a:cxnLst>
+                <a:cxn ang="0">
+                  <a:pos x="connsiteX0" y="connsiteY0"/>
+                </a:cxn>
+                <a:cxn ang="0">
+                  <a:pos x="connsiteX1" y="connsiteY1"/>
+                </a:cxn>
+              </a:cxnLst>
+              <a:rect l="l" t="t" r="r" b="b"/>
+              <a:pathLst>
+                <a:path w="66675" h="38100">
+                  <a:moveTo>
+                    <a:pt x="66675" y="38100"/>
+                  </a:moveTo>
+                  <a:cubicBezTo>
+                    <a:pt x="12962" y="5872"/>
+                    <a:pt x="35609" y="17804"/>
+                    <a:pt x="0" y="0"/>
+                  </a:cubicBezTo>
+                </a:path>
+              </a:pathLst>
+            </a:custGeom>
+            <a:noFill/>
+            <a:ln>
+              <a:solidFill>
+                <a:srgbClr val="C00000"/>
+              </a:solidFill>
+            </a:ln>
+          </p:spPr>
+          <p:style>
+            <a:lnRef idx="2">
+              <a:schemeClr val="accent1">
+                <a:shade val="50000"/>
+              </a:schemeClr>
+            </a:lnRef>
+            <a:fillRef idx="1">
+              <a:schemeClr val="accent1"/>
+            </a:fillRef>
+            <a:effectRef idx="0">
+              <a:schemeClr val="accent1"/>
+            </a:effectRef>
+            <a:fontRef idx="minor">
+              <a:schemeClr val="lt1"/>
+            </a:fontRef>
+          </p:style>
+          <p:txBody>
+            <a:bodyPr rtlCol="0" anchor="ctr"/>
+            <a:lstStyle/>
+            <a:p>
+              <a:pPr algn="ctr"/>
+              <a:endParaRPr lang="it-IT"/>
+            </a:p>
+          </p:txBody>
+        </p:sp>
+        <p:sp>
+          <p:nvSpPr>
+            <p:cNvPr id="7" name="Figura a mano libera 75">
+              <a:extLst>
+                <a:ext uri="{FF2B5EF4-FFF2-40B4-BE49-F238E27FC236}">
+                  <a16:creationId xmlns:a16="http://schemas.microsoft.com/office/drawing/2014/main" id="{74474911-83D2-4583-8298-4ACA2D55D0B4}"/>
+                </a:ext>
+              </a:extLst>
+            </p:cNvPr>
+            <p:cNvSpPr/>
+            <p:nvPr/>
+          </p:nvSpPr>
+          <p:spPr>
+            <a:xfrm>
+              <a:off x="5419725" y="5381625"/>
+              <a:ext cx="47625" cy="57150"/>
+            </a:xfrm>
+            <a:custGeom>
+              <a:avLst/>
+              <a:gdLst>
+                <a:gd name="connsiteX0" fmla="*/ 47625 w 47625"/>
+                <a:gd name="connsiteY0" fmla="*/ 0 h 57150"/>
+                <a:gd name="connsiteX1" fmla="*/ 0 w 47625"/>
+                <a:gd name="connsiteY1" fmla="*/ 57150 h 57150"/>
+              </a:gdLst>
+              <a:ahLst/>
+              <a:cxnLst>
+                <a:cxn ang="0">
+                  <a:pos x="connsiteX0" y="connsiteY0"/>
+                </a:cxn>
+                <a:cxn ang="0">
+                  <a:pos x="connsiteX1" y="connsiteY1"/>
+                </a:cxn>
+              </a:cxnLst>
+              <a:rect l="l" t="t" r="r" b="b"/>
+              <a:pathLst>
+                <a:path w="47625" h="57150">
+                  <a:moveTo>
+                    <a:pt x="47625" y="0"/>
+                  </a:moveTo>
+                  <a:cubicBezTo>
+                    <a:pt x="15397" y="53713"/>
+                    <a:pt x="35609" y="39346"/>
+                    <a:pt x="0" y="57150"/>
+                  </a:cubicBezTo>
+                </a:path>
+              </a:pathLst>
+            </a:custGeom>
+            <a:noFill/>
+            <a:ln>
+              <a:solidFill>
+                <a:srgbClr val="C00000"/>
+              </a:solidFill>
+            </a:ln>
+          </p:spPr>
+          <p:style>
+            <a:lnRef idx="2">
+              <a:schemeClr val="accent1">
+                <a:shade val="50000"/>
+              </a:schemeClr>
+            </a:lnRef>
+            <a:fillRef idx="1">
+              <a:schemeClr val="accent1"/>
+            </a:fillRef>
+            <a:effectRef idx="0">
+              <a:schemeClr val="accent1"/>
+            </a:effectRef>
+            <a:fontRef idx="minor">
+              <a:schemeClr val="lt1"/>
+            </a:fontRef>
+          </p:style>
+          <p:txBody>
+            <a:bodyPr rtlCol="0" anchor="ctr"/>
+            <a:lstStyle/>
+            <a:p>
+              <a:pPr algn="ctr"/>
+              <a:endParaRPr lang="it-IT"/>
+            </a:p>
+          </p:txBody>
+        </p:sp>
+      </p:grpSp>
+      <p:sp>
+        <p:nvSpPr>
+          <p:cNvPr id="8" name="CasellaDiTesto 77">
+            <a:extLst>
+              <a:ext uri="{FF2B5EF4-FFF2-40B4-BE49-F238E27FC236}">
+                <a16:creationId xmlns:a16="http://schemas.microsoft.com/office/drawing/2014/main" id="{A44277E5-DB00-4094-88D9-A3A76F021088}"/>
+              </a:ext>
+            </a:extLst>
+          </p:cNvPr>
+          <p:cNvSpPr txBox="1"/>
+          <p:nvPr/>
+        </p:nvSpPr>
+        <p:spPr>
+          <a:xfrm>
+            <a:off x="2045921" y="1482282"/>
+            <a:ext cx="714939" cy="400110"/>
+          </a:xfrm>
+          <a:prstGeom prst="rect">
+            <a:avLst/>
+          </a:prstGeom>
+          <a:noFill/>
+        </p:spPr>
+        <p:txBody>
+          <a:bodyPr wrap="none" rtlCol="0">
+            <a:spAutoFit/>
+          </a:bodyPr>
+          <a:lstStyle/>
+          <a:p>
+            <a:r>
+              <a:rPr lang="it-IT" sz="2000" dirty="0" err="1"/>
+              <a:t>Event</a:t>
+            </a:r>
+            <a:endParaRPr lang="en-GB" sz="2000" dirty="0"/>
+          </a:p>
+        </p:txBody>
+      </p:sp>
+      <p:grpSp>
+        <p:nvGrpSpPr>
+          <p:cNvPr id="9" name="Gruppo 56">
+            <a:extLst>
+              <a:ext uri="{FF2B5EF4-FFF2-40B4-BE49-F238E27FC236}">
+                <a16:creationId xmlns:a16="http://schemas.microsoft.com/office/drawing/2014/main" id="{74F6FB65-B2FC-43AB-952F-EB880AD9A766}"/>
+              </a:ext>
+            </a:extLst>
+          </p:cNvPr>
+          <p:cNvGrpSpPr/>
+          <p:nvPr/>
+        </p:nvGrpSpPr>
+        <p:grpSpPr>
+          <a:xfrm>
+            <a:off x="1140700" y="868506"/>
+            <a:ext cx="667405" cy="86434"/>
+            <a:chOff x="4586473" y="4245346"/>
+            <a:chExt cx="667405" cy="86434"/>
+          </a:xfrm>
+        </p:grpSpPr>
+        <p:sp>
+          <p:nvSpPr>
+            <p:cNvPr id="10" name="Freccia a destra 58">
+              <a:extLst>
+                <a:ext uri="{FF2B5EF4-FFF2-40B4-BE49-F238E27FC236}">
+                  <a16:creationId xmlns:a16="http://schemas.microsoft.com/office/drawing/2014/main" id="{2874F787-D303-4944-A765-CCDE457EC84E}"/>
+                </a:ext>
+              </a:extLst>
+            </p:cNvPr>
+            <p:cNvSpPr/>
+            <p:nvPr/>
+          </p:nvSpPr>
+          <p:spPr>
+            <a:xfrm>
+              <a:off x="4586473" y="4251518"/>
+              <a:ext cx="577147" cy="80262"/>
+            </a:xfrm>
+            <a:prstGeom prst="rightArrow">
+              <a:avLst/>
+            </a:prstGeom>
+          </p:spPr>
+          <p:style>
+            <a:lnRef idx="1">
+              <a:schemeClr val="accent1"/>
+            </a:lnRef>
+            <a:fillRef idx="2">
+              <a:schemeClr val="accent1"/>
+            </a:fillRef>
+            <a:effectRef idx="1">
+              <a:schemeClr val="accent1"/>
+            </a:effectRef>
+            <a:fontRef idx="minor">
+              <a:schemeClr val="dk1"/>
+            </a:fontRef>
+          </p:style>
+          <p:txBody>
+            <a:bodyPr rtlCol="0" anchor="ctr"/>
+            <a:lstStyle/>
+            <a:p>
+              <a:pPr algn="ctr"/>
+              <a:endParaRPr lang="en-GB"/>
+            </a:p>
+          </p:txBody>
+        </p:sp>
+        <p:sp>
+          <p:nvSpPr>
+            <p:cNvPr id="11" name="Triangolo isoscele 76">
+              <a:extLst>
+                <a:ext uri="{FF2B5EF4-FFF2-40B4-BE49-F238E27FC236}">
+                  <a16:creationId xmlns:a16="http://schemas.microsoft.com/office/drawing/2014/main" id="{E916AB63-4782-439B-A9B0-E9AD2E838EB1}"/>
+                </a:ext>
+              </a:extLst>
+            </p:cNvPr>
+            <p:cNvSpPr/>
+            <p:nvPr/>
+          </p:nvSpPr>
+          <p:spPr>
+            <a:xfrm rot="5400000" flipH="1">
+              <a:off x="5141030" y="4218931"/>
+              <a:ext cx="86434" cy="139263"/>
+            </a:xfrm>
+            <a:prstGeom prst="triangle">
+              <a:avLst/>
+            </a:prstGeom>
+            <a:solidFill>
+              <a:schemeClr val="bg1"/>
+            </a:solidFill>
+            <a:ln/>
+          </p:spPr>
+          <p:style>
+            <a:lnRef idx="1">
+              <a:schemeClr val="accent5"/>
+            </a:lnRef>
+            <a:fillRef idx="2">
+              <a:schemeClr val="accent5"/>
+            </a:fillRef>
+            <a:effectRef idx="1">
+              <a:schemeClr val="accent5"/>
+            </a:effectRef>
+            <a:fontRef idx="minor">
+              <a:schemeClr val="dk1"/>
+            </a:fontRef>
+          </p:style>
+          <p:txBody>
+            <a:bodyPr rtlCol="0" anchor="ctr"/>
+            <a:lstStyle/>
+            <a:p>
+              <a:pPr algn="ctr"/>
+              <a:endParaRPr lang="en-GB" sz="1200">
+                <a:solidFill>
+                  <a:schemeClr val="dk1"/>
+                </a:solidFill>
+              </a:endParaRPr>
+            </a:p>
+          </p:txBody>
+        </p:sp>
+      </p:grpSp>
+      <p:sp>
+        <p:nvSpPr>
+          <p:cNvPr id="12" name="CasellaDiTesto 80">
+            <a:extLst>
+              <a:ext uri="{FF2B5EF4-FFF2-40B4-BE49-F238E27FC236}">
+                <a16:creationId xmlns:a16="http://schemas.microsoft.com/office/drawing/2014/main" id="{72B5600D-A098-4BE0-9D29-4E981D471DE0}"/>
+              </a:ext>
+            </a:extLst>
+          </p:cNvPr>
+          <p:cNvSpPr txBox="1"/>
+          <p:nvPr/>
+        </p:nvSpPr>
+        <p:spPr>
+          <a:xfrm>
+            <a:off x="2016875" y="292678"/>
+            <a:ext cx="995209" cy="400110"/>
+          </a:xfrm>
+          <a:prstGeom prst="rect">
+            <a:avLst/>
+          </a:prstGeom>
+          <a:noFill/>
+        </p:spPr>
+        <p:txBody>
+          <a:bodyPr wrap="none" rtlCol="0">
+            <a:spAutoFit/>
+          </a:bodyPr>
+          <a:lstStyle/>
+          <a:p>
+            <a:r>
+              <a:rPr lang="it-IT" sz="2000" dirty="0" err="1"/>
+              <a:t>Dispatch</a:t>
+            </a:r>
+            <a:endParaRPr lang="en-GB" sz="2000" dirty="0"/>
+          </a:p>
+        </p:txBody>
+      </p:sp>
+      <p:sp>
+        <p:nvSpPr>
+          <p:cNvPr id="13" name="CasellaDiTesto 81">
+            <a:extLst>
+              <a:ext uri="{FF2B5EF4-FFF2-40B4-BE49-F238E27FC236}">
+                <a16:creationId xmlns:a16="http://schemas.microsoft.com/office/drawing/2014/main" id="{2832473F-CC41-4D67-95E6-8748F15632CD}"/>
+              </a:ext>
+            </a:extLst>
+          </p:cNvPr>
+          <p:cNvSpPr txBox="1"/>
+          <p:nvPr/>
+        </p:nvSpPr>
+        <p:spPr>
+          <a:xfrm>
+            <a:off x="2021261" y="731116"/>
+            <a:ext cx="933269" cy="400110"/>
+          </a:xfrm>
+          <a:prstGeom prst="rect">
+            <a:avLst/>
+          </a:prstGeom>
+          <a:noFill/>
+        </p:spPr>
+        <p:txBody>
+          <a:bodyPr wrap="none" rtlCol="0">
+            <a:spAutoFit/>
+          </a:bodyPr>
+          <a:lstStyle/>
+          <a:p>
+            <a:r>
+              <a:rPr lang="it-IT" sz="2000" dirty="0" err="1"/>
+              <a:t>Request</a:t>
+            </a:r>
+            <a:endParaRPr lang="en-GB" sz="2000" dirty="0"/>
+          </a:p>
+        </p:txBody>
+      </p:sp>
+      <p:grpSp>
+        <p:nvGrpSpPr>
+          <p:cNvPr id="14" name="Gruppo 87">
+            <a:extLst>
+              <a:ext uri="{FF2B5EF4-FFF2-40B4-BE49-F238E27FC236}">
+                <a16:creationId xmlns:a16="http://schemas.microsoft.com/office/drawing/2014/main" id="{CDDB6DF8-445A-4D3C-9E6E-3D2D9BA565D8}"/>
+              </a:ext>
+            </a:extLst>
+          </p:cNvPr>
+          <p:cNvGrpSpPr/>
+          <p:nvPr/>
+        </p:nvGrpSpPr>
+        <p:grpSpPr>
+          <a:xfrm>
+            <a:off x="1159459" y="1131226"/>
+            <a:ext cx="666895" cy="86434"/>
+            <a:chOff x="4592177" y="4419530"/>
+            <a:chExt cx="666895" cy="86434"/>
+          </a:xfrm>
+        </p:grpSpPr>
+        <p:cxnSp>
+          <p:nvCxnSpPr>
+            <p:cNvPr id="15" name="Connettore 1 89">
+              <a:extLst>
+                <a:ext uri="{FF2B5EF4-FFF2-40B4-BE49-F238E27FC236}">
+                  <a16:creationId xmlns:a16="http://schemas.microsoft.com/office/drawing/2014/main" id="{A504012D-1DBC-427E-92AD-67E4D62B312F}"/>
+                </a:ext>
+              </a:extLst>
+            </p:cNvPr>
+            <p:cNvCxnSpPr/>
+            <p:nvPr/>
+          </p:nvCxnSpPr>
+          <p:spPr>
+            <a:xfrm>
+              <a:off x="4611000" y="4462747"/>
+              <a:ext cx="648072" cy="0"/>
+            </a:xfrm>
+            <a:prstGeom prst="line">
+              <a:avLst/>
+            </a:prstGeom>
+            <a:ln>
+              <a:prstDash val="dash"/>
+            </a:ln>
+          </p:spPr>
+          <p:style>
+            <a:lnRef idx="1">
+              <a:schemeClr val="accent1"/>
+            </a:lnRef>
+            <a:fillRef idx="0">
+              <a:schemeClr val="accent1"/>
+            </a:fillRef>
+            <a:effectRef idx="0">
+              <a:schemeClr val="accent1"/>
+            </a:effectRef>
+            <a:fontRef idx="minor">
+              <a:schemeClr val="tx1"/>
+            </a:fontRef>
+          </p:style>
+        </p:cxnSp>
+        <p:sp>
+          <p:nvSpPr>
+            <p:cNvPr id="16" name="Triangolo isoscele 90">
+              <a:extLst>
+                <a:ext uri="{FF2B5EF4-FFF2-40B4-BE49-F238E27FC236}">
+                  <a16:creationId xmlns:a16="http://schemas.microsoft.com/office/drawing/2014/main" id="{AF6509DD-8D3D-4911-B351-E7BF33D0D71A}"/>
+                </a:ext>
+              </a:extLst>
+            </p:cNvPr>
+            <p:cNvSpPr/>
+            <p:nvPr/>
+          </p:nvSpPr>
+          <p:spPr>
+            <a:xfrm rot="16200000">
+              <a:off x="4618592" y="4393115"/>
+              <a:ext cx="86434" cy="139263"/>
+            </a:xfrm>
+            <a:prstGeom prst="triangle">
+              <a:avLst/>
+            </a:prstGeom>
+            <a:solidFill>
+              <a:schemeClr val="bg1"/>
+            </a:solidFill>
+            <a:ln/>
+          </p:spPr>
+          <p:style>
+            <a:lnRef idx="1">
+              <a:schemeClr val="accent5"/>
+            </a:lnRef>
+            <a:fillRef idx="2">
+              <a:schemeClr val="accent5"/>
+            </a:fillRef>
+            <a:effectRef idx="1">
+              <a:schemeClr val="accent5"/>
+            </a:effectRef>
+            <a:fontRef idx="minor">
+              <a:schemeClr val="dk1"/>
+            </a:fontRef>
+          </p:style>
+          <p:txBody>
+            <a:bodyPr rtlCol="0" anchor="ctr"/>
+            <a:lstStyle/>
+            <a:p>
+              <a:pPr algn="ctr"/>
+              <a:endParaRPr lang="en-GB" sz="1200"/>
+            </a:p>
+          </p:txBody>
+        </p:sp>
+      </p:grpSp>
+      <p:sp>
+        <p:nvSpPr>
+          <p:cNvPr id="17" name="CasellaDiTesto 91">
+            <a:extLst>
+              <a:ext uri="{FF2B5EF4-FFF2-40B4-BE49-F238E27FC236}">
+                <a16:creationId xmlns:a16="http://schemas.microsoft.com/office/drawing/2014/main" id="{EAF9BEEA-F8F7-4B16-BF60-8B8EAD064DE5}"/>
+              </a:ext>
+            </a:extLst>
+          </p:cNvPr>
+          <p:cNvSpPr txBox="1"/>
+          <p:nvPr/>
+        </p:nvSpPr>
+        <p:spPr>
+          <a:xfrm>
+            <a:off x="2039509" y="959794"/>
+            <a:ext cx="721351" cy="400110"/>
+          </a:xfrm>
+          <a:prstGeom prst="rect">
+            <a:avLst/>
+          </a:prstGeom>
+          <a:noFill/>
+        </p:spPr>
+        <p:txBody>
+          <a:bodyPr wrap="none" rtlCol="0">
+            <a:spAutoFit/>
+          </a:bodyPr>
+          <a:lstStyle/>
+          <a:p>
+            <a:r>
+              <a:rPr lang="it-IT" sz="2000" dirty="0" err="1"/>
+              <a:t>Reply</a:t>
+            </a:r>
+            <a:endParaRPr lang="en-GB" sz="2000" dirty="0"/>
+          </a:p>
+        </p:txBody>
+      </p:sp>
+      <p:cxnSp>
+        <p:nvCxnSpPr>
+          <p:cNvPr id="18" name="Connettore 2 92">
+            <a:extLst>
+              <a:ext uri="{FF2B5EF4-FFF2-40B4-BE49-F238E27FC236}">
+                <a16:creationId xmlns:a16="http://schemas.microsoft.com/office/drawing/2014/main" id="{373280F8-F690-4A62-ACB0-582565EF381B}"/>
+              </a:ext>
+            </a:extLst>
+          </p:cNvPr>
+          <p:cNvCxnSpPr/>
+          <p:nvPr/>
+        </p:nvCxnSpPr>
+        <p:spPr>
+          <a:xfrm>
+            <a:off x="1119490" y="498769"/>
+            <a:ext cx="783259" cy="0"/>
+          </a:xfrm>
+          <a:prstGeom prst="straightConnector1">
+            <a:avLst/>
+          </a:prstGeom>
+          <a:ln>
+            <a:prstDash val="lgDash"/>
+            <a:tailEnd type="arrow"/>
+          </a:ln>
+        </p:spPr>
+        <p:style>
+          <a:lnRef idx="1">
+            <a:schemeClr val="accent1"/>
+          </a:lnRef>
+          <a:fillRef idx="0">
+            <a:schemeClr val="accent1"/>
+          </a:fillRef>
+          <a:effectRef idx="0">
+            <a:schemeClr val="accent1"/>
+          </a:effectRef>
+          <a:fontRef idx="minor">
+            <a:schemeClr val="tx1"/>
+          </a:fontRef>
+        </p:style>
+      </p:cxnSp>
+      <p:grpSp>
+        <p:nvGrpSpPr>
+          <p:cNvPr id="20" name="Gruppo 82">
+            <a:extLst>
+              <a:ext uri="{FF2B5EF4-FFF2-40B4-BE49-F238E27FC236}">
+                <a16:creationId xmlns:a16="http://schemas.microsoft.com/office/drawing/2014/main" id="{12D969AC-9EB0-4CF5-9EE5-D0DD7ACA9C72}"/>
+              </a:ext>
+            </a:extLst>
+          </p:cNvPr>
+          <p:cNvGrpSpPr/>
+          <p:nvPr/>
+        </p:nvGrpSpPr>
+        <p:grpSpPr>
+          <a:xfrm>
+            <a:off x="1603089" y="2584776"/>
+            <a:ext cx="866156" cy="763297"/>
+            <a:chOff x="1194666" y="2417771"/>
+            <a:chExt cx="866156" cy="763297"/>
+          </a:xfrm>
+        </p:grpSpPr>
+        <p:sp>
+          <p:nvSpPr>
+            <p:cNvPr id="21" name="Ovale 38">
+              <a:extLst>
+                <a:ext uri="{FF2B5EF4-FFF2-40B4-BE49-F238E27FC236}">
+                  <a16:creationId xmlns:a16="http://schemas.microsoft.com/office/drawing/2014/main" id="{0EB3DE65-C1E4-4AD3-B909-2646317ECA68}"/>
+                </a:ext>
+              </a:extLst>
+            </p:cNvPr>
+            <p:cNvSpPr/>
+            <p:nvPr/>
+          </p:nvSpPr>
+          <p:spPr>
+            <a:xfrm>
+              <a:off x="1311101" y="2460988"/>
+              <a:ext cx="749721" cy="720080"/>
+            </a:xfrm>
+            <a:prstGeom prst="ellipse">
+              <a:avLst/>
+            </a:prstGeom>
+            <a:solidFill>
+              <a:srgbClr val="FFCCFF"/>
+            </a:solidFill>
+            <a:ln/>
+          </p:spPr>
+          <p:style>
+            <a:lnRef idx="1">
+              <a:schemeClr val="accent5"/>
+            </a:lnRef>
+            <a:fillRef idx="2">
+              <a:schemeClr val="accent5"/>
+            </a:fillRef>
+            <a:effectRef idx="1">
+              <a:schemeClr val="accent5"/>
+            </a:effectRef>
+            <a:fontRef idx="minor">
+              <a:schemeClr val="dk1"/>
+            </a:fontRef>
+          </p:style>
+          <p:txBody>
+            <a:bodyPr rtlCol="0" anchor="ctr"/>
+            <a:lstStyle/>
+            <a:p>
+              <a:pPr algn="ctr"/>
+              <a:r>
+                <a:rPr lang="en-GB" sz="1200" dirty="0"/>
+                <a:t> </a:t>
+              </a:r>
+            </a:p>
+          </p:txBody>
+        </p:sp>
+        <p:sp>
+          <p:nvSpPr>
+            <p:cNvPr id="22" name="Rettangolo 39">
+              <a:extLst>
+                <a:ext uri="{FF2B5EF4-FFF2-40B4-BE49-F238E27FC236}">
+                  <a16:creationId xmlns:a16="http://schemas.microsoft.com/office/drawing/2014/main" id="{AAF0ABD1-BB2B-450B-9369-91FF5B4CE129}"/>
+                </a:ext>
+              </a:extLst>
+            </p:cNvPr>
+            <p:cNvSpPr/>
+            <p:nvPr/>
+          </p:nvSpPr>
+          <p:spPr>
+            <a:xfrm>
+              <a:off x="1194666" y="2699711"/>
+              <a:ext cx="281433" cy="211952"/>
+            </a:xfrm>
+            <a:prstGeom prst="rect">
+              <a:avLst/>
+            </a:prstGeom>
+            <a:solidFill>
+              <a:srgbClr val="FFCCFF"/>
+            </a:solidFill>
+            <a:ln/>
+          </p:spPr>
+          <p:style>
+            <a:lnRef idx="1">
+              <a:schemeClr val="accent5"/>
+            </a:lnRef>
+            <a:fillRef idx="2">
+              <a:schemeClr val="accent5"/>
+            </a:fillRef>
+            <a:effectRef idx="1">
+              <a:schemeClr val="accent5"/>
+            </a:effectRef>
+            <a:fontRef idx="minor">
+              <a:schemeClr val="dk1"/>
+            </a:fontRef>
+          </p:style>
+          <p:txBody>
+            <a:bodyPr rtlCol="0" anchor="ctr"/>
+            <a:lstStyle/>
+            <a:p>
+              <a:pPr algn="ctr"/>
+              <a:endParaRPr lang="en-GB" sz="1200"/>
+            </a:p>
+          </p:txBody>
+        </p:sp>
+        <p:sp>
+          <p:nvSpPr>
+            <p:cNvPr id="23" name="Triangolo isoscele 42">
+              <a:extLst>
+                <a:ext uri="{FF2B5EF4-FFF2-40B4-BE49-F238E27FC236}">
+                  <a16:creationId xmlns:a16="http://schemas.microsoft.com/office/drawing/2014/main" id="{34D1AFB1-88AB-4A6C-9824-2CF6DE11BF7C}"/>
+                </a:ext>
+              </a:extLst>
+            </p:cNvPr>
+            <p:cNvSpPr/>
+            <p:nvPr/>
+          </p:nvSpPr>
+          <p:spPr>
+            <a:xfrm rot="16200000">
+              <a:off x="1618539" y="2391356"/>
+              <a:ext cx="86434" cy="139263"/>
+            </a:xfrm>
+            <a:prstGeom prst="triangle">
+              <a:avLst/>
+            </a:prstGeom>
+            <a:solidFill>
+              <a:srgbClr val="FF0000"/>
+            </a:solidFill>
+            <a:ln/>
+          </p:spPr>
+          <p:style>
+            <a:lnRef idx="1">
+              <a:schemeClr val="accent5"/>
+            </a:lnRef>
+            <a:fillRef idx="2">
+              <a:schemeClr val="accent5"/>
+            </a:fillRef>
+            <a:effectRef idx="1">
+              <a:schemeClr val="accent5"/>
+            </a:effectRef>
+            <a:fontRef idx="minor">
+              <a:schemeClr val="dk1"/>
+            </a:fontRef>
+          </p:style>
+          <p:txBody>
+            <a:bodyPr rtlCol="0" anchor="ctr"/>
+            <a:lstStyle/>
+            <a:p>
+              <a:pPr algn="ctr"/>
+              <a:endParaRPr lang="en-GB" sz="1200">
+                <a:solidFill>
+                  <a:schemeClr val="dk1"/>
+                </a:solidFill>
+              </a:endParaRPr>
+            </a:p>
+          </p:txBody>
+        </p:sp>
+      </p:grpSp>
+      <p:sp>
+        <p:nvSpPr>
+          <p:cNvPr id="24" name="Rectangle 4">
+            <a:extLst>
+              <a:ext uri="{FF2B5EF4-FFF2-40B4-BE49-F238E27FC236}">
+                <a16:creationId xmlns:a16="http://schemas.microsoft.com/office/drawing/2014/main" id="{FA1CA8BE-B059-415B-B299-7E0D7424128A}"/>
+              </a:ext>
+            </a:extLst>
+          </p:cNvPr>
+          <p:cNvSpPr>
+            <a:spLocks noChangeArrowheads="1"/>
+          </p:cNvSpPr>
+          <p:nvPr/>
+        </p:nvSpPr>
+        <p:spPr bwMode="auto">
+          <a:xfrm>
+            <a:off x="1515379" y="3455988"/>
+            <a:ext cx="1109599" cy="307777"/>
+          </a:xfrm>
+          <a:prstGeom prst="rect">
+            <a:avLst/>
+          </a:prstGeom>
+          <a:noFill/>
+        </p:spPr>
+        <p:txBody>
+          <a:bodyPr wrap="none" rtlCol="0">
+            <a:spAutoFit/>
+          </a:bodyPr>
+          <a:lstStyle/>
+          <a:p>
+            <a:r>
+              <a:rPr lang="en-US" altLang="en-US" sz="1400" b="1" dirty="0" err="1">
+                <a:solidFill>
+                  <a:srgbClr val="0070C0"/>
+                </a:solidFill>
+                <a:latin typeface="Arial" panose="020B0604020202020204" pitchFamily="34" charset="0"/>
+                <a:cs typeface="Arial" panose="020B0604020202020204" pitchFamily="34" charset="0"/>
+              </a:rPr>
+              <a:t>robotActor</a:t>
+            </a:r>
+            <a:endParaRPr lang="en-US" altLang="en-US" sz="1400" dirty="0">
+              <a:latin typeface="Arial" panose="020B0604020202020204" pitchFamily="34" charset="0"/>
+              <a:cs typeface="Arial" panose="020B0604020202020204" pitchFamily="34" charset="0"/>
+            </a:endParaRPr>
+          </a:p>
+        </p:txBody>
+      </p:sp>
+      <p:sp>
+        <p:nvSpPr>
+          <p:cNvPr id="25" name="Ovale 33">
+            <a:extLst>
+              <a:ext uri="{FF2B5EF4-FFF2-40B4-BE49-F238E27FC236}">
+                <a16:creationId xmlns:a16="http://schemas.microsoft.com/office/drawing/2014/main" id="{A4E6BBEC-1E11-48AC-9881-2BCB8F6CF48A}"/>
+              </a:ext>
+            </a:extLst>
+          </p:cNvPr>
+          <p:cNvSpPr/>
+          <p:nvPr/>
+        </p:nvSpPr>
+        <p:spPr>
+          <a:xfrm>
+            <a:off x="4286300" y="2652761"/>
+            <a:ext cx="749721" cy="720080"/>
+          </a:xfrm>
+          <a:prstGeom prst="ellipse">
+            <a:avLst/>
+          </a:prstGeom>
+          <a:ln/>
+        </p:spPr>
+        <p:style>
+          <a:lnRef idx="1">
+            <a:schemeClr val="accent5"/>
+          </a:lnRef>
+          <a:fillRef idx="2">
+            <a:schemeClr val="accent5"/>
+          </a:fillRef>
+          <a:effectRef idx="1">
+            <a:schemeClr val="accent5"/>
+          </a:effectRef>
+          <a:fontRef idx="minor">
+            <a:schemeClr val="dk1"/>
+          </a:fontRef>
+        </p:style>
+        <p:txBody>
+          <a:bodyPr rtlCol="0" anchor="ctr"/>
+          <a:lstStyle/>
+          <a:p>
+            <a:pPr algn="ctr"/>
+            <a:r>
+              <a:rPr lang="en-GB" sz="1200" dirty="0"/>
+              <a:t> </a:t>
+            </a:r>
+          </a:p>
+        </p:txBody>
+      </p:sp>
+      <p:sp>
+        <p:nvSpPr>
+          <p:cNvPr id="26" name="CasellaDiTesto 19">
+            <a:extLst>
+              <a:ext uri="{FF2B5EF4-FFF2-40B4-BE49-F238E27FC236}">
+                <a16:creationId xmlns:a16="http://schemas.microsoft.com/office/drawing/2014/main" id="{11853092-90FB-4FF0-A8A7-8E1E956C1000}"/>
+              </a:ext>
+            </a:extLst>
+          </p:cNvPr>
+          <p:cNvSpPr txBox="1"/>
+          <p:nvPr/>
+        </p:nvSpPr>
+        <p:spPr>
+          <a:xfrm>
+            <a:off x="4144022" y="3484314"/>
+            <a:ext cx="253596" cy="461665"/>
+          </a:xfrm>
+          <a:prstGeom prst="rect">
+            <a:avLst/>
+          </a:prstGeom>
+          <a:noFill/>
+        </p:spPr>
+        <p:txBody>
+          <a:bodyPr wrap="none" rtlCol="0">
+            <a:spAutoFit/>
+          </a:bodyPr>
+          <a:lstStyle/>
+          <a:p>
+            <a:r>
+              <a:rPr lang="it-IT" sz="2400" dirty="0"/>
+              <a:t> </a:t>
+            </a:r>
+            <a:endParaRPr lang="en-GB" sz="2400" dirty="0"/>
+          </a:p>
+        </p:txBody>
+      </p:sp>
+      <p:sp>
+        <p:nvSpPr>
+          <p:cNvPr id="27" name="Rectangle 4">
+            <a:extLst>
+              <a:ext uri="{FF2B5EF4-FFF2-40B4-BE49-F238E27FC236}">
+                <a16:creationId xmlns:a16="http://schemas.microsoft.com/office/drawing/2014/main" id="{57A31D5F-E223-48B4-A819-ADBF29AA214F}"/>
+              </a:ext>
+            </a:extLst>
+          </p:cNvPr>
+          <p:cNvSpPr>
+            <a:spLocks noChangeArrowheads="1"/>
+          </p:cNvSpPr>
+          <p:nvPr/>
+        </p:nvSpPr>
+        <p:spPr bwMode="auto">
+          <a:xfrm>
+            <a:off x="3982165" y="3340299"/>
+            <a:ext cx="2909771" cy="738664"/>
+          </a:xfrm>
+          <a:prstGeom prst="rect">
+            <a:avLst/>
+          </a:prstGeom>
+          <a:noFill/>
+        </p:spPr>
+        <p:txBody>
+          <a:bodyPr wrap="none" rtlCol="0">
+            <a:spAutoFit/>
+          </a:bodyPr>
+          <a:lstStyle/>
+          <a:p>
+            <a:r>
+              <a:rPr lang="en-US" sz="1400" b="1" dirty="0" err="1">
+                <a:solidFill>
+                  <a:srgbClr val="0070C0"/>
+                </a:solidFill>
+                <a:latin typeface="Arial" panose="020B0604020202020204" pitchFamily="34" charset="0"/>
+                <a:cs typeface="Arial" panose="020B0604020202020204" pitchFamily="34" charset="0"/>
+              </a:rPr>
+              <a:t>virtualRobotSupport</a:t>
+            </a:r>
+            <a:endParaRPr lang="en-US" altLang="en-US" sz="1400" b="1" dirty="0">
+              <a:solidFill>
+                <a:srgbClr val="0070C0"/>
+              </a:solidFill>
+              <a:latin typeface="Arial" panose="020B0604020202020204" pitchFamily="34" charset="0"/>
+              <a:cs typeface="Arial" panose="020B0604020202020204" pitchFamily="34" charset="0"/>
+            </a:endParaRPr>
+          </a:p>
+          <a:p>
+            <a:r>
+              <a:rPr lang="en-US" altLang="en-US" sz="1400" dirty="0">
+                <a:latin typeface="Arial" panose="020B0604020202020204" pitchFamily="34" charset="0"/>
+                <a:cs typeface="Arial" panose="020B0604020202020204" pitchFamily="34" charset="0"/>
+              </a:rPr>
+              <a:t>(starts a coroutine that </a:t>
+            </a:r>
+          </a:p>
+          <a:p>
+            <a:r>
+              <a:rPr lang="en-US" altLang="en-US" sz="1400" dirty="0">
+                <a:latin typeface="Arial" panose="020B0604020202020204" pitchFamily="34" charset="0"/>
+                <a:cs typeface="Arial" panose="020B0604020202020204" pitchFamily="34" charset="0"/>
+              </a:rPr>
+              <a:t>sends messages to </a:t>
+            </a:r>
+            <a:r>
+              <a:rPr lang="en-US" altLang="en-US" sz="1400" b="1" dirty="0" err="1">
+                <a:solidFill>
+                  <a:srgbClr val="0070C0"/>
+                </a:solidFill>
+                <a:latin typeface="Arial" panose="020B0604020202020204" pitchFamily="34" charset="0"/>
+                <a:cs typeface="Arial" panose="020B0604020202020204" pitchFamily="34" charset="0"/>
+              </a:rPr>
+              <a:t>robotActor</a:t>
+            </a:r>
+            <a:r>
+              <a:rPr lang="en-US" altLang="en-US" sz="1400" dirty="0">
+                <a:latin typeface="Arial" panose="020B0604020202020204" pitchFamily="34" charset="0"/>
+                <a:cs typeface="Arial" panose="020B0604020202020204" pitchFamily="34" charset="0"/>
+              </a:rPr>
+              <a:t>) </a:t>
+            </a:r>
+          </a:p>
+        </p:txBody>
+      </p:sp>
+      <p:cxnSp>
+        <p:nvCxnSpPr>
+          <p:cNvPr id="28" name="Connettore 2 126">
+            <a:extLst>
+              <a:ext uri="{FF2B5EF4-FFF2-40B4-BE49-F238E27FC236}">
+                <a16:creationId xmlns:a16="http://schemas.microsoft.com/office/drawing/2014/main" id="{36CC678F-7232-496B-B9F9-4DE6B53CD494}"/>
+              </a:ext>
+            </a:extLst>
+          </p:cNvPr>
+          <p:cNvCxnSpPr/>
+          <p:nvPr/>
+        </p:nvCxnSpPr>
+        <p:spPr>
+          <a:xfrm flipH="1">
+            <a:off x="4666132" y="2816250"/>
+            <a:ext cx="13466" cy="393101"/>
+          </a:xfrm>
+          <a:prstGeom prst="straightConnector1">
+            <a:avLst/>
+          </a:prstGeom>
+          <a:ln>
+            <a:solidFill>
+              <a:srgbClr val="C00000"/>
+            </a:solidFill>
+            <a:prstDash val="lgDash"/>
+            <a:tailEnd type="arrow"/>
+          </a:ln>
+        </p:spPr>
+        <p:style>
+          <a:lnRef idx="1">
+            <a:schemeClr val="accent1"/>
+          </a:lnRef>
+          <a:fillRef idx="0">
+            <a:schemeClr val="accent1"/>
+          </a:fillRef>
+          <a:effectRef idx="0">
+            <a:schemeClr val="accent1"/>
+          </a:effectRef>
+          <a:fontRef idx="minor">
+            <a:schemeClr val="tx1"/>
+          </a:fontRef>
+        </p:style>
+      </p:cxnSp>
+      <p:cxnSp>
+        <p:nvCxnSpPr>
+          <p:cNvPr id="29" name="Connettore 2 9">
+            <a:extLst>
+              <a:ext uri="{FF2B5EF4-FFF2-40B4-BE49-F238E27FC236}">
+                <a16:creationId xmlns:a16="http://schemas.microsoft.com/office/drawing/2014/main" id="{04DF4836-F901-4EBA-8385-88CA97E6F661}"/>
+              </a:ext>
+            </a:extLst>
+          </p:cNvPr>
+          <p:cNvCxnSpPr>
+            <a:cxnSpLocks/>
+            <a:stCxn id="21" idx="6"/>
+            <a:endCxn id="25" idx="2"/>
+          </p:cNvCxnSpPr>
+          <p:nvPr/>
+        </p:nvCxnSpPr>
+        <p:spPr>
+          <a:xfrm>
+            <a:off x="2469245" y="2988033"/>
+            <a:ext cx="1817055" cy="24768"/>
+          </a:xfrm>
+          <a:prstGeom prst="straightConnector1">
+            <a:avLst/>
+          </a:prstGeom>
+          <a:ln>
+            <a:solidFill>
+              <a:srgbClr val="002060"/>
+            </a:solidFill>
+            <a:tailEnd type="arrow"/>
+          </a:ln>
+        </p:spPr>
+        <p:style>
+          <a:lnRef idx="1">
+            <a:schemeClr val="accent1"/>
+          </a:lnRef>
+          <a:fillRef idx="0">
+            <a:schemeClr val="accent1"/>
+          </a:fillRef>
+          <a:effectRef idx="0">
+            <a:schemeClr val="accent1"/>
+          </a:effectRef>
+          <a:fontRef idx="minor">
+            <a:schemeClr val="tx1"/>
+          </a:fontRef>
+        </p:style>
+      </p:cxnSp>
+      <p:sp>
+        <p:nvSpPr>
+          <p:cNvPr id="30" name="Rectangle 5">
+            <a:extLst>
+              <a:ext uri="{FF2B5EF4-FFF2-40B4-BE49-F238E27FC236}">
+                <a16:creationId xmlns:a16="http://schemas.microsoft.com/office/drawing/2014/main" id="{2514E10A-0E65-4430-A48F-330F1F0FD1D1}"/>
+              </a:ext>
+            </a:extLst>
+          </p:cNvPr>
+          <p:cNvSpPr>
+            <a:spLocks noChangeArrowheads="1"/>
+          </p:cNvSpPr>
+          <p:nvPr/>
+        </p:nvSpPr>
+        <p:spPr bwMode="auto">
+          <a:xfrm>
+            <a:off x="2493119" y="2577782"/>
+            <a:ext cx="1982053" cy="307777"/>
+          </a:xfrm>
+          <a:prstGeom prst="rect">
+            <a:avLst/>
+          </a:prstGeom>
+          <a:noFill/>
+        </p:spPr>
+        <p:txBody>
+          <a:bodyPr wrap="square" rtlCol="0">
+            <a:spAutoFit/>
+          </a:bodyPr>
+          <a:lstStyle/>
+          <a:p>
+            <a:r>
+              <a:rPr lang="en-US" altLang="en-US" sz="1400" b="1" dirty="0" err="1">
+                <a:latin typeface="Arial" panose="020B0604020202020204" pitchFamily="34" charset="0"/>
+                <a:cs typeface="Arial" panose="020B0604020202020204" pitchFamily="34" charset="0"/>
+              </a:rPr>
+              <a:t>domove</a:t>
+            </a:r>
+            <a:r>
+              <a:rPr lang="en-US" altLang="en-US" sz="1400" dirty="0">
+                <a:latin typeface="Arial" panose="020B0604020202020204" pitchFamily="34" charset="0"/>
+                <a:cs typeface="Arial" panose="020B0604020202020204" pitchFamily="34" charset="0"/>
+              </a:rPr>
+              <a:t>( </a:t>
+            </a:r>
+            <a:r>
+              <a:rPr lang="en-US" altLang="en-US" sz="1400" dirty="0" err="1">
+                <a:latin typeface="Arial" panose="020B0604020202020204" pitchFamily="34" charset="0"/>
+                <a:cs typeface="Arial" panose="020B0604020202020204" pitchFamily="34" charset="0"/>
+              </a:rPr>
+              <a:t>cmd</a:t>
+            </a:r>
+            <a:r>
+              <a:rPr lang="en-US" altLang="en-US" sz="1400" dirty="0">
+                <a:latin typeface="Arial" panose="020B0604020202020204" pitchFamily="34" charset="0"/>
+                <a:cs typeface="Arial" panose="020B0604020202020204" pitchFamily="34" charset="0"/>
+              </a:rPr>
+              <a:t>: String ) </a:t>
+            </a:r>
+          </a:p>
+        </p:txBody>
+      </p:sp>
+      <p:sp>
+        <p:nvSpPr>
+          <p:cNvPr id="31" name="Rectangle 5">
+            <a:extLst>
+              <a:ext uri="{FF2B5EF4-FFF2-40B4-BE49-F238E27FC236}">
+                <a16:creationId xmlns:a16="http://schemas.microsoft.com/office/drawing/2014/main" id="{DFDC7F0A-882C-4149-983D-9A958C225794}"/>
+              </a:ext>
+            </a:extLst>
+          </p:cNvPr>
+          <p:cNvSpPr>
+            <a:spLocks noChangeArrowheads="1"/>
+          </p:cNvSpPr>
+          <p:nvPr/>
+        </p:nvSpPr>
+        <p:spPr bwMode="auto">
+          <a:xfrm>
+            <a:off x="5059895" y="2598015"/>
+            <a:ext cx="702436" cy="307777"/>
+          </a:xfrm>
+          <a:prstGeom prst="rect">
+            <a:avLst/>
+          </a:prstGeom>
+          <a:noFill/>
+        </p:spPr>
+        <p:txBody>
+          <a:bodyPr wrap="none" rtlCol="0">
+            <a:spAutoFit/>
+          </a:bodyPr>
+          <a:lstStyle/>
+          <a:p>
+            <a:r>
+              <a:rPr lang="en-US" altLang="en-US" sz="1400" dirty="0">
+                <a:latin typeface="Arial" panose="020B0604020202020204" pitchFamily="34" charset="0"/>
+                <a:cs typeface="Arial" panose="020B0604020202020204" pitchFamily="34" charset="0"/>
+              </a:rPr>
+              <a:t>socket</a:t>
+            </a:r>
+          </a:p>
+        </p:txBody>
+      </p:sp>
+      <p:sp>
+        <p:nvSpPr>
+          <p:cNvPr id="32" name="Ovale 33">
+            <a:extLst>
+              <a:ext uri="{FF2B5EF4-FFF2-40B4-BE49-F238E27FC236}">
+                <a16:creationId xmlns:a16="http://schemas.microsoft.com/office/drawing/2014/main" id="{3D0173EE-08DD-4F1E-9226-740254360410}"/>
+              </a:ext>
+            </a:extLst>
+          </p:cNvPr>
+          <p:cNvSpPr/>
+          <p:nvPr/>
+        </p:nvSpPr>
+        <p:spPr>
+          <a:xfrm>
+            <a:off x="5295010" y="2885287"/>
+            <a:ext cx="312930" cy="275021"/>
+          </a:xfrm>
+          <a:prstGeom prst="ellipse">
+            <a:avLst/>
+          </a:prstGeom>
+          <a:ln/>
+        </p:spPr>
+        <p:style>
+          <a:lnRef idx="1">
+            <a:schemeClr val="accent5"/>
+          </a:lnRef>
+          <a:fillRef idx="2">
+            <a:schemeClr val="accent5"/>
+          </a:fillRef>
+          <a:effectRef idx="1">
+            <a:schemeClr val="accent5"/>
+          </a:effectRef>
+          <a:fontRef idx="minor">
+            <a:schemeClr val="dk1"/>
+          </a:fontRef>
+        </p:style>
+        <p:txBody>
+          <a:bodyPr rtlCol="0" anchor="ctr"/>
+          <a:lstStyle/>
+          <a:p>
+            <a:pPr algn="ctr"/>
+            <a:r>
+              <a:rPr lang="en-GB" sz="1200" dirty="0"/>
+              <a:t> </a:t>
+            </a:r>
+          </a:p>
+        </p:txBody>
+      </p:sp>
+      <p:cxnSp>
+        <p:nvCxnSpPr>
+          <p:cNvPr id="33" name="Straight Arrow Connector 32">
+            <a:extLst>
+              <a:ext uri="{FF2B5EF4-FFF2-40B4-BE49-F238E27FC236}">
+                <a16:creationId xmlns:a16="http://schemas.microsoft.com/office/drawing/2014/main" id="{F5733152-082A-43F7-B943-085C85850C21}"/>
+              </a:ext>
+            </a:extLst>
+          </p:cNvPr>
+          <p:cNvCxnSpPr>
+            <a:endCxn id="32" idx="2"/>
+          </p:cNvCxnSpPr>
+          <p:nvPr/>
+        </p:nvCxnSpPr>
+        <p:spPr>
+          <a:xfrm>
+            <a:off x="5017129" y="3016587"/>
+            <a:ext cx="277881" cy="6211"/>
+          </a:xfrm>
+          <a:prstGeom prst="straightConnector1">
+            <a:avLst/>
+          </a:prstGeom>
+          <a:ln>
+            <a:tailEnd type="triangle"/>
+          </a:ln>
+        </p:spPr>
+        <p:style>
+          <a:lnRef idx="1">
+            <a:schemeClr val="accent1"/>
+          </a:lnRef>
+          <a:fillRef idx="0">
+            <a:schemeClr val="accent1"/>
+          </a:fillRef>
+          <a:effectRef idx="0">
+            <a:schemeClr val="accent1"/>
+          </a:effectRef>
+          <a:fontRef idx="minor">
+            <a:schemeClr val="tx1"/>
+          </a:fontRef>
+        </p:style>
+      </p:cxnSp>
+      <p:cxnSp>
+        <p:nvCxnSpPr>
+          <p:cNvPr id="34" name="Connector: Elbow 33">
+            <a:extLst>
+              <a:ext uri="{FF2B5EF4-FFF2-40B4-BE49-F238E27FC236}">
+                <a16:creationId xmlns:a16="http://schemas.microsoft.com/office/drawing/2014/main" id="{6E0866FF-855D-4981-849D-973D1B152AB3}"/>
+              </a:ext>
+            </a:extLst>
+          </p:cNvPr>
+          <p:cNvCxnSpPr>
+            <a:cxnSpLocks/>
+            <a:stCxn id="25" idx="3"/>
+            <a:endCxn id="35" idx="4"/>
+          </p:cNvCxnSpPr>
+          <p:nvPr/>
+        </p:nvCxnSpPr>
+        <p:spPr>
+          <a:xfrm rot="5400000" flipH="1">
+            <a:off x="2682188" y="1553482"/>
+            <a:ext cx="185414" cy="3242398"/>
+          </a:xfrm>
+          <a:prstGeom prst="bentConnector3">
+            <a:avLst>
+              <a:gd name="adj1" fmla="val -394410"/>
+            </a:avLst>
+          </a:prstGeom>
+          <a:ln>
+            <a:prstDash val="lgDash"/>
+            <a:tailEnd type="arrow"/>
+          </a:ln>
+        </p:spPr>
+        <p:style>
+          <a:lnRef idx="1">
+            <a:schemeClr val="accent1"/>
+          </a:lnRef>
+          <a:fillRef idx="0">
+            <a:schemeClr val="accent1"/>
+          </a:fillRef>
+          <a:effectRef idx="0">
+            <a:schemeClr val="accent1"/>
+          </a:effectRef>
+          <a:fontRef idx="minor">
+            <a:schemeClr val="tx1"/>
+          </a:fontRef>
+        </p:style>
+      </p:cxnSp>
+      <p:sp>
+        <p:nvSpPr>
+          <p:cNvPr id="35" name="Oval 34">
+            <a:extLst>
+              <a:ext uri="{FF2B5EF4-FFF2-40B4-BE49-F238E27FC236}">
+                <a16:creationId xmlns:a16="http://schemas.microsoft.com/office/drawing/2014/main" id="{65481011-CBAC-4F9B-821D-2FF28D949DEA}"/>
+              </a:ext>
+            </a:extLst>
+          </p:cNvPr>
+          <p:cNvSpPr/>
+          <p:nvPr/>
+        </p:nvSpPr>
+        <p:spPr>
+          <a:xfrm>
+            <a:off x="1041833" y="2850876"/>
+            <a:ext cx="223725" cy="231098"/>
+          </a:xfrm>
+          <a:prstGeom prst="ellipse">
+            <a:avLst/>
+          </a:prstGeom>
+          <a:solidFill>
+            <a:schemeClr val="bg1"/>
+          </a:solidFill>
+          <a:ln>
+            <a:solidFill>
+              <a:schemeClr val="bg1"/>
+            </a:solidFill>
+          </a:ln>
+        </p:spPr>
+        <p:style>
+          <a:lnRef idx="2">
+            <a:schemeClr val="accent1">
+              <a:shade val="50000"/>
+            </a:schemeClr>
+          </a:lnRef>
+          <a:fillRef idx="1">
+            <a:schemeClr val="accent1"/>
+          </a:fillRef>
+          <a:effectRef idx="0">
+            <a:schemeClr val="accent1"/>
+          </a:effectRef>
+          <a:fontRef idx="minor">
+            <a:schemeClr val="lt1"/>
+          </a:fontRef>
+        </p:style>
+        <p:txBody>
+          <a:bodyPr rtlCol="0" anchor="ctr"/>
+          <a:lstStyle/>
+          <a:p>
+            <a:pPr algn="ctr"/>
+            <a:endParaRPr lang="en-US"/>
+          </a:p>
+        </p:txBody>
+      </p:sp>
+      <p:cxnSp>
+        <p:nvCxnSpPr>
+          <p:cNvPr id="36" name="Connettore 2 92">
+            <a:extLst>
+              <a:ext uri="{FF2B5EF4-FFF2-40B4-BE49-F238E27FC236}">
+                <a16:creationId xmlns:a16="http://schemas.microsoft.com/office/drawing/2014/main" id="{6FD6BF04-777C-407D-B010-E858A36FD965}"/>
+              </a:ext>
+            </a:extLst>
+          </p:cNvPr>
+          <p:cNvCxnSpPr/>
+          <p:nvPr/>
+        </p:nvCxnSpPr>
+        <p:spPr>
+          <a:xfrm>
+            <a:off x="819830" y="3047880"/>
+            <a:ext cx="783259" cy="0"/>
+          </a:xfrm>
+          <a:prstGeom prst="straightConnector1">
+            <a:avLst/>
+          </a:prstGeom>
+          <a:ln>
+            <a:prstDash val="lgDash"/>
+            <a:tailEnd type="arrow"/>
+          </a:ln>
+        </p:spPr>
+        <p:style>
+          <a:lnRef idx="1">
+            <a:schemeClr val="accent1"/>
+          </a:lnRef>
+          <a:fillRef idx="0">
+            <a:schemeClr val="accent1"/>
+          </a:fillRef>
+          <a:effectRef idx="0">
+            <a:schemeClr val="accent1"/>
+          </a:effectRef>
+          <a:fontRef idx="minor">
+            <a:schemeClr val="tx1"/>
+          </a:fontRef>
+        </p:style>
+      </p:cxnSp>
+      <p:sp>
+        <p:nvSpPr>
+          <p:cNvPr id="38" name="Rectangle 5">
+            <a:extLst>
+              <a:ext uri="{FF2B5EF4-FFF2-40B4-BE49-F238E27FC236}">
+                <a16:creationId xmlns:a16="http://schemas.microsoft.com/office/drawing/2014/main" id="{EB817455-7F07-4D5C-B180-91ED8A2903CA}"/>
+              </a:ext>
+            </a:extLst>
+          </p:cNvPr>
+          <p:cNvSpPr>
+            <a:spLocks noChangeArrowheads="1"/>
+          </p:cNvSpPr>
+          <p:nvPr/>
+        </p:nvSpPr>
+        <p:spPr bwMode="auto">
+          <a:xfrm>
+            <a:off x="1755917" y="4023317"/>
+            <a:ext cx="5064754" cy="307777"/>
+          </a:xfrm>
+          <a:prstGeom prst="rect">
+            <a:avLst/>
+          </a:prstGeom>
+          <a:noFill/>
+        </p:spPr>
+        <p:txBody>
+          <a:bodyPr wrap="square" rtlCol="0">
+            <a:spAutoFit/>
+          </a:bodyPr>
+          <a:lstStyle/>
+          <a:p>
+            <a:r>
+              <a:rPr lang="en-US" sz="1400" b="1" dirty="0">
+                <a:solidFill>
+                  <a:srgbClr val="00B050"/>
+                </a:solidFill>
+                <a:latin typeface="Arial" panose="020B0604020202020204" pitchFamily="34" charset="0"/>
+                <a:cs typeface="Arial" panose="020B0604020202020204" pitchFamily="34" charset="0"/>
+              </a:rPr>
+              <a:t>msg(</a:t>
+            </a:r>
+            <a:r>
+              <a:rPr lang="en-US" sz="1400" b="1" dirty="0" err="1">
+                <a:solidFill>
+                  <a:srgbClr val="00B050"/>
+                </a:solidFill>
+                <a:latin typeface="Arial" panose="020B0604020202020204" pitchFamily="34" charset="0"/>
+                <a:cs typeface="Arial" panose="020B0604020202020204" pitchFamily="34" charset="0"/>
+              </a:rPr>
+              <a:t>sensor,dispatch,vr,robotactor</a:t>
+            </a:r>
+            <a:r>
+              <a:rPr lang="en-US" sz="1400" b="1" dirty="0">
+                <a:solidFill>
+                  <a:srgbClr val="00B050"/>
+                </a:solidFill>
+                <a:latin typeface="Arial" panose="020B0604020202020204" pitchFamily="34" charset="0"/>
+                <a:cs typeface="Arial" panose="020B0604020202020204" pitchFamily="34" charset="0"/>
+              </a:rPr>
+              <a:t>, collision-bottle2, 6)</a:t>
+            </a:r>
+          </a:p>
+        </p:txBody>
+      </p:sp>
+      <p:sp>
+        <p:nvSpPr>
+          <p:cNvPr id="39" name="Rectangle 5">
+            <a:extLst>
+              <a:ext uri="{FF2B5EF4-FFF2-40B4-BE49-F238E27FC236}">
+                <a16:creationId xmlns:a16="http://schemas.microsoft.com/office/drawing/2014/main" id="{57B70A4C-684C-498F-B66C-2400E2253AFD}"/>
+              </a:ext>
+            </a:extLst>
+          </p:cNvPr>
+          <p:cNvSpPr>
+            <a:spLocks noChangeArrowheads="1"/>
+          </p:cNvSpPr>
+          <p:nvPr/>
+        </p:nvSpPr>
+        <p:spPr bwMode="auto">
+          <a:xfrm>
+            <a:off x="541764" y="2339876"/>
+            <a:ext cx="4438192" cy="307777"/>
+          </a:xfrm>
+          <a:prstGeom prst="rect">
+            <a:avLst/>
+          </a:prstGeom>
+          <a:noFill/>
+        </p:spPr>
+        <p:txBody>
+          <a:bodyPr wrap="square" rtlCol="0">
+            <a:spAutoFit/>
+          </a:bodyPr>
+          <a:lstStyle/>
+          <a:p>
+            <a:r>
+              <a:rPr lang="en-US" sz="1400" b="1" dirty="0">
+                <a:solidFill>
+                  <a:srgbClr val="00B050"/>
+                </a:solidFill>
+                <a:latin typeface="Arial" panose="020B0604020202020204" pitchFamily="34" charset="0"/>
+                <a:cs typeface="Arial" panose="020B0604020202020204" pitchFamily="34" charset="0"/>
+              </a:rPr>
+              <a:t>msg(move, dispatch, main, </a:t>
+            </a:r>
+            <a:r>
+              <a:rPr lang="en-US" sz="1400" b="1" dirty="0" err="1">
+                <a:solidFill>
+                  <a:srgbClr val="00B050"/>
+                </a:solidFill>
+                <a:latin typeface="Arial" panose="020B0604020202020204" pitchFamily="34" charset="0"/>
+                <a:cs typeface="Arial" panose="020B0604020202020204" pitchFamily="34" charset="0"/>
+              </a:rPr>
+              <a:t>robotactor</a:t>
+            </a:r>
+            <a:r>
+              <a:rPr lang="en-US" sz="1400" b="1" dirty="0">
+                <a:solidFill>
+                  <a:srgbClr val="00B050"/>
+                </a:solidFill>
+                <a:latin typeface="Arial" panose="020B0604020202020204" pitchFamily="34" charset="0"/>
+                <a:cs typeface="Arial" panose="020B0604020202020204" pitchFamily="34" charset="0"/>
+              </a:rPr>
+              <a:t>, w, 1)</a:t>
+            </a:r>
+          </a:p>
+        </p:txBody>
+      </p:sp>
+    </p:spTree>
+    <p:extLst>
+      <p:ext uri="{BB962C8B-B14F-4D97-AF65-F5344CB8AC3E}">
+        <p14:creationId xmlns:p14="http://schemas.microsoft.com/office/powerpoint/2010/main" val="1552529730"/>
+      </p:ext>
+    </p:extLst>
+  </p:cSld>
+  <p:clrMapOvr>
+    <a:masterClrMapping/>
+  </p:clrMapOvr>
+</p:sld>
+</file>
+
+<file path=ppt/slides/slide28.xml><?xml version="1.0" encoding="utf-8"?>
+<p:sld xmlns:a="http://schemas.openxmlformats.org/drawingml/2006/main" xmlns:r="http://schemas.openxmlformats.org/officeDocument/2006/relationships" xmlns:p="http://schemas.openxmlformats.org/presentationml/2006/main">
+  <p:cSld>
+    <p:spTree>
+      <p:nvGrpSpPr>
+        <p:cNvPr id="1" name=""/>
+        <p:cNvGrpSpPr/>
+        <p:nvPr/>
+      </p:nvGrpSpPr>
+      <p:grpSpPr>
+        <a:xfrm>
+          <a:off x="0" y="0"/>
+          <a:ext cx="0" cy="0"/>
+          <a:chOff x="0" y="0"/>
+          <a:chExt cx="0" cy="0"/>
+        </a:xfrm>
+      </p:grpSpPr>
+      <p:sp>
+        <p:nvSpPr>
           <p:cNvPr id="2" name="Segnaposto piè di pagina 1"/>
           <p:cNvSpPr>
             <a:spLocks noGrp="1"/>
@@ -15078,7 +17081,7 @@
           <a:p>
             <a:fld id="{6F6A5AB3-AF76-4EC9-853D-D4C335162C13}" type="slidenum">
               <a:rPr lang="en-GB" smtClean="0"/>
-              <a:t>27</a:t>
+              <a:t>28</a:t>
             </a:fld>
             <a:endParaRPr lang="en-GB"/>
           </a:p>
@@ -15722,7 +17725,7 @@
 </p:sld>
 </file>
 
-<file path=ppt/slides/slide28.xml><?xml version="1.0" encoding="utf-8"?>
+<file path=ppt/slides/slide29.xml><?xml version="1.0" encoding="utf-8"?>
 <p:sld xmlns:a="http://schemas.openxmlformats.org/drawingml/2006/main" xmlns:r="http://schemas.openxmlformats.org/officeDocument/2006/relationships" xmlns:p="http://schemas.openxmlformats.org/presentationml/2006/main">
   <p:cSld>
     <p:spTree>
@@ -15936,7 +17939,7 @@
           <a:p>
             <a:fld id="{6F6A5AB3-AF76-4EC9-853D-D4C335162C13}" type="slidenum">
               <a:rPr lang="en-GB" smtClean="0"/>
-              <a:t>28</a:t>
+              <a:t>29</a:t>
             </a:fld>
             <a:endParaRPr lang="en-GB"/>
           </a:p>

</xml_diff>

<commit_message>
kotlin intro dispatchers and sequences
</commit_message>
<xml_diff>
--- a/it.unibo.issLabStart/userDocs/ISSM2020.pptx
+++ b/it.unibo.issLabStart/userDocs/ISSM2020.pptx
@@ -16928,12 +16928,32 @@
             <a:r>
               <a:rPr lang="en-US" sz="1400" b="1" dirty="0" err="1">
                 <a:solidFill>
+                  <a:srgbClr val="C00000"/>
+                </a:solidFill>
+                <a:latin typeface="Arial" panose="020B0604020202020204" pitchFamily="34" charset="0"/>
+                <a:cs typeface="Arial" panose="020B0604020202020204" pitchFamily="34" charset="0"/>
+              </a:rPr>
+              <a:t>sensor</a:t>
+            </a:r>
+            <a:r>
+              <a:rPr lang="en-US" sz="1400" b="1" dirty="0" err="1">
+                <a:solidFill>
                   <a:srgbClr val="00B050"/>
                 </a:solidFill>
                 <a:latin typeface="Arial" panose="020B0604020202020204" pitchFamily="34" charset="0"/>
                 <a:cs typeface="Arial" panose="020B0604020202020204" pitchFamily="34" charset="0"/>
               </a:rPr>
-              <a:t>sensor,dispatch,vr,robotactor</a:t>
+              <a:t>,dispatch,vr,</a:t>
+            </a:r>
+            <a:r>
+              <a:rPr lang="en-US" sz="1400" b="1" dirty="0" err="1">
+                <a:solidFill>
+                  <a:srgbClr val="1318ED"/>
+                </a:solidFill>
+                <a:latin typeface="Arial" panose="020B0604020202020204" pitchFamily="34" charset="0"/>
+                <a:cs typeface="Arial" panose="020B0604020202020204" pitchFamily="34" charset="0"/>
+              </a:rPr>
+              <a:t>robotactor</a:t>
             </a:r>
             <a:r>
               <a:rPr lang="en-US" sz="1400" b="1" dirty="0">
@@ -16943,7 +16963,27 @@
                 <a:latin typeface="Arial" panose="020B0604020202020204" pitchFamily="34" charset="0"/>
                 <a:cs typeface="Arial" panose="020B0604020202020204" pitchFamily="34" charset="0"/>
               </a:rPr>
-              <a:t>, collision-bottle2, 6)</a:t>
+              <a:t>, </a:t>
+            </a:r>
+            <a:r>
+              <a:rPr lang="en-US" sz="1400" b="1" dirty="0">
+                <a:solidFill>
+                  <a:srgbClr val="0070C0"/>
+                </a:solidFill>
+                <a:latin typeface="Arial" panose="020B0604020202020204" pitchFamily="34" charset="0"/>
+                <a:cs typeface="Arial" panose="020B0604020202020204" pitchFamily="34" charset="0"/>
+              </a:rPr>
+              <a:t>collision-bottle2</a:t>
+            </a:r>
+            <a:r>
+              <a:rPr lang="en-US" sz="1400" b="1" dirty="0">
+                <a:solidFill>
+                  <a:srgbClr val="00B050"/>
+                </a:solidFill>
+                <a:latin typeface="Arial" panose="020B0604020202020204" pitchFamily="34" charset="0"/>
+                <a:cs typeface="Arial" panose="020B0604020202020204" pitchFamily="34" charset="0"/>
+              </a:rPr>
+              <a:t>, 6)</a:t>
             </a:r>
           </a:p>
         </p:txBody>
@@ -16986,17 +17026,17 @@
                 <a:latin typeface="Arial" panose="020B0604020202020204" pitchFamily="34" charset="0"/>
                 <a:cs typeface="Arial" panose="020B0604020202020204" pitchFamily="34" charset="0"/>
               </a:rPr>
-              <a:t>msg(move, dispatch, main, </a:t>
-            </a:r>
-            <a:r>
-              <a:rPr lang="en-US" sz="1400" b="1" dirty="0" err="1">
+              <a:t>msg(</a:t>
+            </a:r>
+            <a:r>
+              <a:rPr lang="en-US" sz="1400" b="1" dirty="0">
                 <a:solidFill>
-                  <a:srgbClr val="00B050"/>
+                  <a:srgbClr val="C00000"/>
                 </a:solidFill>
                 <a:latin typeface="Arial" panose="020B0604020202020204" pitchFamily="34" charset="0"/>
                 <a:cs typeface="Arial" panose="020B0604020202020204" pitchFamily="34" charset="0"/>
               </a:rPr>
-              <a:t>robotactor</a:t>
+              <a:t>move</a:t>
             </a:r>
             <a:r>
               <a:rPr lang="en-US" sz="1400" b="1" dirty="0">
@@ -17006,7 +17046,47 @@
                 <a:latin typeface="Arial" panose="020B0604020202020204" pitchFamily="34" charset="0"/>
                 <a:cs typeface="Arial" panose="020B0604020202020204" pitchFamily="34" charset="0"/>
               </a:rPr>
-              <a:t>, w, 1)</a:t>
+              <a:t>, dispatch, main, </a:t>
+            </a:r>
+            <a:r>
+              <a:rPr lang="en-US" sz="1400" b="1" dirty="0" err="1">
+                <a:solidFill>
+                  <a:srgbClr val="1318ED"/>
+                </a:solidFill>
+                <a:latin typeface="Arial" panose="020B0604020202020204" pitchFamily="34" charset="0"/>
+                <a:cs typeface="Arial" panose="020B0604020202020204" pitchFamily="34" charset="0"/>
+              </a:rPr>
+              <a:t>robotactor</a:t>
+            </a:r>
+            <a:r>
+              <a:rPr lang="en-US" sz="1400" b="1" dirty="0">
+                <a:solidFill>
+                  <a:srgbClr val="00B050"/>
+                </a:solidFill>
+                <a:latin typeface="Arial" panose="020B0604020202020204" pitchFamily="34" charset="0"/>
+                <a:cs typeface="Arial" panose="020B0604020202020204" pitchFamily="34" charset="0"/>
+              </a:rPr>
+              <a:t>, </a:t>
+            </a:r>
+            <a:r>
+              <a:rPr lang="en-US" sz="1400" b="1" dirty="0">
+                <a:solidFill>
+                  <a:srgbClr val="0070C0"/>
+                </a:solidFill>
+                <a:latin typeface="Arial" panose="020B0604020202020204" pitchFamily="34" charset="0"/>
+                <a:cs typeface="Arial" panose="020B0604020202020204" pitchFamily="34" charset="0"/>
+              </a:rPr>
+              <a:t>w</a:t>
+            </a:r>
+            <a:r>
+              <a:rPr lang="en-US" sz="1400" b="1" dirty="0">
+                <a:solidFill>
+                  <a:srgbClr val="00B050"/>
+                </a:solidFill>
+                <a:latin typeface="Arial" panose="020B0604020202020204" pitchFamily="34" charset="0"/>
+                <a:cs typeface="Arial" panose="020B0604020202020204" pitchFamily="34" charset="0"/>
+              </a:rPr>
+              <a:t>, 1)</a:t>
             </a:r>
           </a:p>
         </p:txBody>

</xml_diff>